<commit_message>
RDMPDEV-712 CachingHost now throws when it gets exceptions amongst it's Tasks Fixed button enabling in ExecuteCacheProgressUI ArgumentFactory no longer throws exception when there are no demands on the class passed, this fixes a bug where UI wouldn't let you add pipeline components with no demands into Pipelines Added CacheProgressStateBasedIconProvider which currently hammers the database to check for permission windows.  We should have PermissionWindow as a child but it's a shared child so ugh Improved deployment documentation in RDMPUniverse.pptx
</commit_message>
<xml_diff>
--- a/Documentation/RDMPUniverse.pptx
+++ b/Documentation/RDMPUniverse.pptx
@@ -33733,6 +33733,45 @@
       </p:grpSpPr>
       <p:sp>
         <p:nvSpPr>
+          <p:cNvPr id="32" name="Rectangle 31"/>
+          <p:cNvSpPr/>
+          <p:nvPr/>
+        </p:nvSpPr>
+        <p:spPr>
+          <a:xfrm>
+            <a:off x="1065401" y="1336898"/>
+            <a:ext cx="10956022" cy="4443117"/>
+          </a:xfrm>
+          <a:prstGeom prst="rect">
+            <a:avLst/>
+          </a:prstGeom>
+          <a:ln w="28575"/>
+        </p:spPr>
+        <p:style>
+          <a:lnRef idx="2">
+            <a:schemeClr val="dk1"/>
+          </a:lnRef>
+          <a:fillRef idx="1">
+            <a:schemeClr val="lt1"/>
+          </a:fillRef>
+          <a:effectRef idx="0">
+            <a:schemeClr val="dk1"/>
+          </a:effectRef>
+          <a:fontRef idx="minor">
+            <a:schemeClr val="dk1"/>
+          </a:fontRef>
+        </p:style>
+        <p:txBody>
+          <a:bodyPr rtlCol="0" anchor="ctr"/>
+          <a:lstStyle/>
+          <a:p>
+            <a:pPr algn="ctr"/>
+            <a:endParaRPr lang="en-GB" dirty="0"/>
+          </a:p>
+        </p:txBody>
+      </p:sp>
+      <p:sp>
+        <p:nvSpPr>
           <p:cNvPr id="2" name="Title 1"/>
           <p:cNvSpPr>
             <a:spLocks noGrp="1"/>
@@ -33761,24 +33800,22 @@
         </p:nvSpPr>
         <p:spPr>
           <a:xfrm>
-            <a:off x="838200" y="2306972"/>
-            <a:ext cx="4396530" cy="3791824"/>
+            <a:off x="1408651" y="1664068"/>
+            <a:ext cx="4396530" cy="2509802"/>
           </a:xfrm>
           <a:prstGeom prst="rect">
             <a:avLst/>
           </a:prstGeom>
         </p:spPr>
         <p:style>
-          <a:lnRef idx="2">
-            <a:schemeClr val="accent1">
-              <a:shade val="50000"/>
-            </a:schemeClr>
+          <a:lnRef idx="1">
+            <a:schemeClr val="accent6"/>
           </a:lnRef>
-          <a:fillRef idx="1">
-            <a:schemeClr val="accent1"/>
+          <a:fillRef idx="3">
+            <a:schemeClr val="accent6"/>
           </a:fillRef>
-          <a:effectRef idx="0">
-            <a:schemeClr val="accent1"/>
+          <a:effectRef idx="2">
+            <a:schemeClr val="accent6"/>
           </a:effectRef>
           <a:fontRef idx="minor">
             <a:schemeClr val="lt1"/>
@@ -33793,6 +33830,18 @@
               <a:rPr lang="en-GB" dirty="0"/>
               <a:t>Data Analyst PC</a:t>
             </a:r>
+            <a:r>
+              <a:rPr lang="en-GB"/>
+              <a:t>/VM</a:t>
+            </a:r>
+          </a:p>
+          <a:p>
+            <a:pPr algn="ctr"/>
+            <a:r>
+              <a:rPr lang="en-US"/>
+              <a:t>(assumed to already exist)</a:t>
+            </a:r>
+            <a:endParaRPr lang="en-GB" dirty="0"/>
           </a:p>
         </p:txBody>
       </p:sp>
@@ -33804,7 +33853,7 @@
         </p:nvSpPr>
         <p:spPr>
           <a:xfrm>
-            <a:off x="2064391" y="4074953"/>
+            <a:off x="2634842" y="3721163"/>
             <a:ext cx="1770078" cy="327170"/>
           </a:xfrm>
           <a:prstGeom prst="rect">
@@ -33847,7 +33896,7 @@
         </p:nvSpPr>
         <p:spPr>
           <a:xfrm>
-            <a:off x="1098958" y="2697061"/>
+            <a:off x="1669409" y="2343271"/>
             <a:ext cx="3700944" cy="1033945"/>
           </a:xfrm>
           <a:prstGeom prst="rect">
@@ -33925,7 +33974,7 @@
         </p:nvSpPr>
         <p:spPr>
           <a:xfrm>
-            <a:off x="6291043" y="2306972"/>
+            <a:off x="6861494" y="1953182"/>
             <a:ext cx="4396530" cy="2248250"/>
           </a:xfrm>
           <a:prstGeom prst="rect">
@@ -33933,16 +33982,14 @@
           </a:prstGeom>
         </p:spPr>
         <p:style>
-          <a:lnRef idx="2">
-            <a:schemeClr val="accent1">
-              <a:shade val="50000"/>
-            </a:schemeClr>
+          <a:lnRef idx="3">
+            <a:schemeClr val="lt1"/>
           </a:lnRef>
           <a:fillRef idx="1">
-            <a:schemeClr val="accent1"/>
+            <a:schemeClr val="accent6"/>
           </a:fillRef>
-          <a:effectRef idx="0">
-            <a:schemeClr val="accent1"/>
+          <a:effectRef idx="1">
+            <a:schemeClr val="accent6"/>
           </a:effectRef>
           <a:fontRef idx="minor">
             <a:schemeClr val="lt1"/>
@@ -33975,7 +34022,7 @@
         </p:nvSpPr>
         <p:spPr>
           <a:xfrm>
-            <a:off x="7106173" y="3041009"/>
+            <a:off x="7676624" y="2687219"/>
             <a:ext cx="3010950" cy="1033944"/>
           </a:xfrm>
           <a:prstGeom prst="rect">
@@ -33983,16 +34030,14 @@
           </a:prstGeom>
         </p:spPr>
         <p:style>
-          <a:lnRef idx="2">
-            <a:schemeClr val="accent1">
-              <a:shade val="50000"/>
-            </a:schemeClr>
+          <a:lnRef idx="3">
+            <a:schemeClr val="lt1"/>
           </a:lnRef>
           <a:fillRef idx="1">
-            <a:schemeClr val="accent1"/>
+            <a:schemeClr val="accent6"/>
           </a:fillRef>
-          <a:effectRef idx="0">
-            <a:schemeClr val="accent1"/>
+          <a:effectRef idx="1">
+            <a:schemeClr val="accent6"/>
           </a:effectRef>
           <a:fontRef idx="minor">
             <a:schemeClr val="lt1"/>
@@ -34024,54 +34069,6 @@
           </a:p>
         </p:txBody>
       </p:sp>
-      <p:sp>
-        <p:nvSpPr>
-          <p:cNvPr id="10" name="Rectangle 9"/>
-          <p:cNvSpPr/>
-          <p:nvPr/>
-        </p:nvSpPr>
-        <p:spPr>
-          <a:xfrm>
-            <a:off x="1098958" y="4655891"/>
-            <a:ext cx="3700944" cy="1124124"/>
-          </a:xfrm>
-          <a:prstGeom prst="rect">
-            <a:avLst/>
-          </a:prstGeom>
-        </p:spPr>
-        <p:style>
-          <a:lnRef idx="2">
-            <a:schemeClr val="accent1">
-              <a:shade val="50000"/>
-            </a:schemeClr>
-          </a:lnRef>
-          <a:fillRef idx="1">
-            <a:schemeClr val="accent1"/>
-          </a:fillRef>
-          <a:effectRef idx="0">
-            <a:schemeClr val="accent1"/>
-          </a:effectRef>
-          <a:fontRef idx="minor">
-            <a:schemeClr val="lt1"/>
-          </a:fontRef>
-        </p:style>
-        <p:txBody>
-          <a:bodyPr rtlCol="0" anchor="t"/>
-          <a:lstStyle/>
-          <a:p>
-            <a:pPr algn="ctr"/>
-            <a:r>
-              <a:rPr lang="en-GB" dirty="0"/>
-              <a:t>Anonymous Extracts Directory</a:t>
-            </a:r>
-            <a:endParaRPr lang="en-GB" sz="1000" dirty="0"/>
-          </a:p>
-          <a:p>
-            <a:pPr algn="ctr"/>
-            <a:endParaRPr lang="en-GB" sz="1000" dirty="0"/>
-          </a:p>
-        </p:txBody>
-      </p:sp>
       <p:cxnSp>
         <p:nvCxnSpPr>
           <p:cNvPr id="13" name="Straight Arrow Connector 12"/>
@@ -34082,7 +34079,7 @@
         </p:nvCxnSpPr>
         <p:spPr>
           <a:xfrm flipV="1">
-            <a:off x="3834469" y="3557981"/>
+            <a:off x="4404920" y="3204191"/>
             <a:ext cx="3271704" cy="653294"/>
           </a:xfrm>
           <a:prstGeom prst="straightConnector1">
@@ -34122,7 +34119,7 @@
         </p:nvCxnSpPr>
         <p:spPr>
           <a:xfrm flipV="1">
-            <a:off x="2949430" y="3731006"/>
+            <a:off x="3519881" y="3377216"/>
             <a:ext cx="0" cy="343947"/>
           </a:xfrm>
           <a:prstGeom prst="straightConnector1">
@@ -34159,7 +34156,7 @@
         </p:nvSpPr>
         <p:spPr>
           <a:xfrm>
-            <a:off x="1966518" y="3802014"/>
+            <a:off x="2536969" y="3448224"/>
             <a:ext cx="2244755" cy="253916"/>
           </a:xfrm>
           <a:prstGeom prst="rect">
@@ -34188,7 +34185,7 @@
         </p:nvSpPr>
         <p:spPr>
           <a:xfrm>
-            <a:off x="5309532" y="3831429"/>
+            <a:off x="5879983" y="3477639"/>
             <a:ext cx="1775670" cy="415498"/>
           </a:xfrm>
           <a:prstGeom prst="rect">
@@ -34217,8 +34214,8 @@
         </p:nvCxnSpPr>
         <p:spPr>
           <a:xfrm>
-            <a:off x="2949430" y="4402123"/>
-            <a:ext cx="0" cy="698383"/>
+            <a:off x="3519881" y="4048333"/>
+            <a:ext cx="3341613" cy="960691"/>
           </a:xfrm>
           <a:prstGeom prst="straightConnector1">
             <a:avLst/>
@@ -34254,7 +34251,7 @@
         </p:nvSpPr>
         <p:spPr>
           <a:xfrm>
-            <a:off x="2064391" y="5108898"/>
+            <a:off x="4781724" y="4464489"/>
             <a:ext cx="1775670" cy="253916"/>
           </a:xfrm>
           <a:prstGeom prst="rect">
@@ -34275,6 +34272,309 @@
           </a:p>
         </p:txBody>
       </p:sp>
+      <p:sp>
+        <p:nvSpPr>
+          <p:cNvPr id="29" name="Rectangle 28"/>
+          <p:cNvSpPr/>
+          <p:nvPr/>
+        </p:nvSpPr>
+        <p:spPr>
+          <a:xfrm>
+            <a:off x="6861494" y="4582083"/>
+            <a:ext cx="4392687" cy="1124124"/>
+          </a:xfrm>
+          <a:prstGeom prst="rect">
+            <a:avLst/>
+          </a:prstGeom>
+        </p:spPr>
+        <p:style>
+          <a:lnRef idx="3">
+            <a:schemeClr val="lt1"/>
+          </a:lnRef>
+          <a:fillRef idx="1">
+            <a:schemeClr val="accent6"/>
+          </a:fillRef>
+          <a:effectRef idx="1">
+            <a:schemeClr val="accent6"/>
+          </a:effectRef>
+          <a:fontRef idx="minor">
+            <a:schemeClr val="lt1"/>
+          </a:fontRef>
+        </p:style>
+        <p:txBody>
+          <a:bodyPr rtlCol="0" anchor="t"/>
+          <a:lstStyle/>
+          <a:p>
+            <a:pPr algn="ctr"/>
+            <a:r>
+              <a:rPr lang="en-GB" dirty="0"/>
+              <a:t>Anonymous Project Extractions File Server </a:t>
+            </a:r>
+          </a:p>
+          <a:p>
+            <a:pPr algn="ctr"/>
+            <a:r>
+              <a:rPr lang="en-GB" dirty="0"/>
+              <a:t>(assumed to already exist)</a:t>
+            </a:r>
+          </a:p>
+          <a:p>
+            <a:pPr algn="ctr"/>
+            <a:endParaRPr lang="en-GB" sz="1000" dirty="0"/>
+          </a:p>
+        </p:txBody>
+      </p:sp>
+      <p:sp>
+        <p:nvSpPr>
+          <p:cNvPr id="33" name="TextBox 32"/>
+          <p:cNvSpPr txBox="1"/>
+          <p:nvPr/>
+        </p:nvSpPr>
+        <p:spPr>
+          <a:xfrm>
+            <a:off x="1198924" y="5332815"/>
+            <a:ext cx="2202719" cy="369332"/>
+          </a:xfrm>
+          <a:prstGeom prst="rect">
+            <a:avLst/>
+          </a:prstGeom>
+          <a:noFill/>
+        </p:spPr>
+        <p:txBody>
+          <a:bodyPr wrap="none" rtlCol="0">
+            <a:spAutoFit/>
+          </a:bodyPr>
+          <a:lstStyle/>
+          <a:p>
+            <a:r>
+              <a:rPr lang="en-US"/>
+              <a:t>NHS Lothian Network</a:t>
+            </a:r>
+            <a:endParaRPr lang="en-GB"/>
+          </a:p>
+        </p:txBody>
+      </p:sp>
+      <p:grpSp>
+        <p:nvGrpSpPr>
+          <p:cNvPr id="43" name="Group 42"/>
+          <p:cNvGrpSpPr/>
+          <p:nvPr/>
+        </p:nvGrpSpPr>
+        <p:grpSpPr>
+          <a:xfrm>
+            <a:off x="1065401" y="5851023"/>
+            <a:ext cx="2374085" cy="1237856"/>
+            <a:chOff x="7927596" y="452832"/>
+            <a:chExt cx="2374085" cy="1237856"/>
+          </a:xfrm>
+        </p:grpSpPr>
+        <p:sp>
+          <p:nvSpPr>
+            <p:cNvPr id="42" name="Rectangle 41"/>
+            <p:cNvSpPr/>
+            <p:nvPr/>
+          </p:nvSpPr>
+          <p:spPr>
+            <a:xfrm>
+              <a:off x="7927596" y="452832"/>
+              <a:ext cx="2189527" cy="1237856"/>
+            </a:xfrm>
+            <a:prstGeom prst="rect">
+              <a:avLst/>
+            </a:prstGeom>
+          </p:spPr>
+          <p:style>
+            <a:lnRef idx="2">
+              <a:schemeClr val="dk1"/>
+            </a:lnRef>
+            <a:fillRef idx="1">
+              <a:schemeClr val="lt1"/>
+            </a:fillRef>
+            <a:effectRef idx="0">
+              <a:schemeClr val="dk1"/>
+            </a:effectRef>
+            <a:fontRef idx="minor">
+              <a:schemeClr val="dk1"/>
+            </a:fontRef>
+          </p:style>
+          <p:txBody>
+            <a:bodyPr rtlCol="0" anchor="ctr"/>
+            <a:lstStyle/>
+            <a:p>
+              <a:pPr algn="ctr"/>
+              <a:endParaRPr lang="en-GB"/>
+            </a:p>
+          </p:txBody>
+        </p:sp>
+        <p:sp>
+          <p:nvSpPr>
+            <p:cNvPr id="34" name="Rectangle 33"/>
+            <p:cNvSpPr/>
+            <p:nvPr/>
+          </p:nvSpPr>
+          <p:spPr>
+            <a:xfrm>
+              <a:off x="8072747" y="867132"/>
+              <a:ext cx="425301" cy="321550"/>
+            </a:xfrm>
+            <a:prstGeom prst="rect">
+              <a:avLst/>
+            </a:prstGeom>
+          </p:spPr>
+          <p:style>
+            <a:lnRef idx="1">
+              <a:schemeClr val="accent6"/>
+            </a:lnRef>
+            <a:fillRef idx="3">
+              <a:schemeClr val="accent6"/>
+            </a:fillRef>
+            <a:effectRef idx="2">
+              <a:schemeClr val="accent6"/>
+            </a:effectRef>
+            <a:fontRef idx="minor">
+              <a:schemeClr val="lt1"/>
+            </a:fontRef>
+          </p:style>
+          <p:txBody>
+            <a:bodyPr rtlCol="0" anchor="t"/>
+            <a:lstStyle/>
+            <a:p>
+              <a:pPr algn="ctr"/>
+              <a:endParaRPr lang="en-GB" dirty="0"/>
+            </a:p>
+          </p:txBody>
+        </p:sp>
+        <p:sp>
+          <p:nvSpPr>
+            <p:cNvPr id="38" name="TextBox 37"/>
+            <p:cNvSpPr txBox="1"/>
+            <p:nvPr/>
+          </p:nvSpPr>
+          <p:spPr>
+            <a:xfrm>
+              <a:off x="7989631" y="452832"/>
+              <a:ext cx="581379" cy="369332"/>
+            </a:xfrm>
+            <a:prstGeom prst="rect">
+              <a:avLst/>
+            </a:prstGeom>
+            <a:noFill/>
+          </p:spPr>
+          <p:txBody>
+            <a:bodyPr wrap="square" rtlCol="0">
+              <a:spAutoFit/>
+            </a:bodyPr>
+            <a:lstStyle/>
+            <a:p>
+              <a:r>
+                <a:rPr lang="en-US"/>
+                <a:t>Key</a:t>
+              </a:r>
+              <a:endParaRPr lang="en-GB"/>
+            </a:p>
+          </p:txBody>
+        </p:sp>
+        <p:sp>
+          <p:nvSpPr>
+            <p:cNvPr id="39" name="TextBox 38"/>
+            <p:cNvSpPr txBox="1"/>
+            <p:nvPr/>
+          </p:nvSpPr>
+          <p:spPr>
+            <a:xfrm>
+              <a:off x="8550608" y="838899"/>
+              <a:ext cx="1751073" cy="369332"/>
+            </a:xfrm>
+            <a:prstGeom prst="rect">
+              <a:avLst/>
+            </a:prstGeom>
+            <a:noFill/>
+          </p:spPr>
+          <p:txBody>
+            <a:bodyPr wrap="square" rtlCol="0">
+              <a:spAutoFit/>
+            </a:bodyPr>
+            <a:lstStyle/>
+            <a:p>
+              <a:r>
+                <a:rPr lang="en-US"/>
+                <a:t>Existing Assets</a:t>
+              </a:r>
+              <a:endParaRPr lang="en-GB"/>
+            </a:p>
+          </p:txBody>
+        </p:sp>
+        <p:sp>
+          <p:nvSpPr>
+            <p:cNvPr id="40" name="Rectangle 39"/>
+            <p:cNvSpPr/>
+            <p:nvPr/>
+          </p:nvSpPr>
+          <p:spPr>
+            <a:xfrm>
+              <a:off x="8072747" y="1253617"/>
+              <a:ext cx="425301" cy="321550"/>
+            </a:xfrm>
+            <a:prstGeom prst="rect">
+              <a:avLst/>
+            </a:prstGeom>
+          </p:spPr>
+          <p:style>
+            <a:lnRef idx="2">
+              <a:schemeClr val="accent1">
+                <a:shade val="50000"/>
+              </a:schemeClr>
+            </a:lnRef>
+            <a:fillRef idx="1">
+              <a:schemeClr val="accent1"/>
+            </a:fillRef>
+            <a:effectRef idx="0">
+              <a:schemeClr val="accent1"/>
+            </a:effectRef>
+            <a:fontRef idx="minor">
+              <a:schemeClr val="lt1"/>
+            </a:fontRef>
+          </p:style>
+          <p:txBody>
+            <a:bodyPr rtlCol="0" anchor="t"/>
+            <a:lstStyle/>
+            <a:p>
+              <a:pPr algn="ctr"/>
+              <a:endParaRPr lang="en-GB" dirty="0"/>
+            </a:p>
+          </p:txBody>
+        </p:sp>
+        <p:sp>
+          <p:nvSpPr>
+            <p:cNvPr id="41" name="TextBox 40"/>
+            <p:cNvSpPr txBox="1"/>
+            <p:nvPr/>
+          </p:nvSpPr>
+          <p:spPr>
+            <a:xfrm>
+              <a:off x="8550608" y="1225384"/>
+              <a:ext cx="1751073" cy="369332"/>
+            </a:xfrm>
+            <a:prstGeom prst="rect">
+              <a:avLst/>
+            </a:prstGeom>
+            <a:noFill/>
+          </p:spPr>
+          <p:txBody>
+            <a:bodyPr wrap="square" rtlCol="0">
+              <a:spAutoFit/>
+            </a:bodyPr>
+            <a:lstStyle/>
+            <a:p>
+              <a:r>
+                <a:rPr lang="en-US"/>
+                <a:t>New Assets</a:t>
+              </a:r>
+              <a:endParaRPr lang="en-GB"/>
+            </a:p>
+          </p:txBody>
+        </p:sp>
+      </p:grpSp>
     </p:spTree>
     <p:extLst>
       <p:ext uri="{BB962C8B-B14F-4D97-AF65-F5344CB8AC3E}">
@@ -34305,6 +34605,75 @@
           <a:chExt cx="0" cy="0"/>
         </a:xfrm>
       </p:grpSpPr>
+      <p:sp>
+        <p:nvSpPr>
+          <p:cNvPr id="48" name="Rectangle 47"/>
+          <p:cNvSpPr/>
+          <p:nvPr/>
+        </p:nvSpPr>
+        <p:spPr>
+          <a:xfrm>
+            <a:off x="494950" y="1291906"/>
+            <a:ext cx="10956022" cy="4555221"/>
+          </a:xfrm>
+          <a:prstGeom prst="rect">
+            <a:avLst/>
+          </a:prstGeom>
+          <a:ln w="28575"/>
+        </p:spPr>
+        <p:style>
+          <a:lnRef idx="2">
+            <a:schemeClr val="dk1"/>
+          </a:lnRef>
+          <a:fillRef idx="1">
+            <a:schemeClr val="lt1"/>
+          </a:fillRef>
+          <a:effectRef idx="0">
+            <a:schemeClr val="dk1"/>
+          </a:effectRef>
+          <a:fontRef idx="minor">
+            <a:schemeClr val="dk1"/>
+          </a:fontRef>
+        </p:style>
+        <p:txBody>
+          <a:bodyPr rtlCol="0" anchor="ctr"/>
+          <a:lstStyle/>
+          <a:p>
+            <a:pPr algn="ctr"/>
+            <a:endParaRPr lang="en-GB" dirty="0"/>
+          </a:p>
+        </p:txBody>
+      </p:sp>
+      <p:sp>
+        <p:nvSpPr>
+          <p:cNvPr id="49" name="TextBox 48"/>
+          <p:cNvSpPr txBox="1"/>
+          <p:nvPr/>
+        </p:nvSpPr>
+        <p:spPr>
+          <a:xfrm>
+            <a:off x="494950" y="5465349"/>
+            <a:ext cx="2202719" cy="369332"/>
+          </a:xfrm>
+          <a:prstGeom prst="rect">
+            <a:avLst/>
+          </a:prstGeom>
+          <a:noFill/>
+        </p:spPr>
+        <p:txBody>
+          <a:bodyPr wrap="none" rtlCol="0">
+            <a:spAutoFit/>
+          </a:bodyPr>
+          <a:lstStyle/>
+          <a:p>
+            <a:r>
+              <a:rPr lang="en-US"/>
+              <a:t>NHS Lothian Network</a:t>
+            </a:r>
+            <a:endParaRPr lang="en-GB"/>
+          </a:p>
+        </p:txBody>
+      </p:sp>
       <p:sp>
         <p:nvSpPr>
           <p:cNvPr id="2" name="Title 1"/>
@@ -34348,16 +34717,14 @@
           </a:prstGeom>
         </p:spPr>
         <p:style>
-          <a:lnRef idx="2">
-            <a:schemeClr val="accent1">
-              <a:shade val="50000"/>
-            </a:schemeClr>
+          <a:lnRef idx="3">
+            <a:schemeClr val="lt1"/>
           </a:lnRef>
           <a:fillRef idx="1">
-            <a:schemeClr val="accent1"/>
+            <a:schemeClr val="accent6"/>
           </a:fillRef>
-          <a:effectRef idx="0">
-            <a:schemeClr val="accent1"/>
+          <a:effectRef idx="1">
+            <a:schemeClr val="accent6"/>
           </a:effectRef>
           <a:fontRef idx="minor">
             <a:schemeClr val="lt1"/>
@@ -34434,16 +34801,14 @@
           </a:prstGeom>
         </p:spPr>
         <p:style>
-          <a:lnRef idx="2">
-            <a:schemeClr val="accent1">
-              <a:shade val="50000"/>
-            </a:schemeClr>
+          <a:lnRef idx="3">
+            <a:schemeClr val="lt1"/>
           </a:lnRef>
           <a:fillRef idx="1">
-            <a:schemeClr val="accent1"/>
+            <a:schemeClr val="accent6"/>
           </a:fillRef>
-          <a:effectRef idx="0">
-            <a:schemeClr val="accent1"/>
+          <a:effectRef idx="1">
+            <a:schemeClr val="accent6"/>
           </a:effectRef>
           <a:fontRef idx="minor">
             <a:schemeClr val="lt1"/>
@@ -34488,16 +34853,14 @@
           </a:prstGeom>
         </p:spPr>
         <p:style>
-          <a:lnRef idx="2">
-            <a:schemeClr val="accent1">
-              <a:shade val="50000"/>
-            </a:schemeClr>
+          <a:lnRef idx="3">
+            <a:schemeClr val="lt1"/>
           </a:lnRef>
           <a:fillRef idx="1">
-            <a:schemeClr val="accent1"/>
+            <a:schemeClr val="accent6"/>
           </a:fillRef>
-          <a:effectRef idx="0">
-            <a:schemeClr val="accent1"/>
+          <a:effectRef idx="1">
+            <a:schemeClr val="accent6"/>
           </a:effectRef>
           <a:fontRef idx="minor">
             <a:schemeClr val="lt1"/>
@@ -34537,7 +34900,7 @@
         </p:nvSpPr>
         <p:spPr>
           <a:xfrm>
-            <a:off x="6638835" y="5175765"/>
+            <a:off x="6499545" y="4502964"/>
             <a:ext cx="4392687" cy="1124124"/>
           </a:xfrm>
           <a:prstGeom prst="rect">
@@ -34545,16 +34908,14 @@
           </a:prstGeom>
         </p:spPr>
         <p:style>
-          <a:lnRef idx="2">
-            <a:schemeClr val="accent1">
-              <a:shade val="50000"/>
-            </a:schemeClr>
+          <a:lnRef idx="3">
+            <a:schemeClr val="lt1"/>
           </a:lnRef>
           <a:fillRef idx="1">
-            <a:schemeClr val="accent1"/>
+            <a:schemeClr val="accent6"/>
           </a:fillRef>
-          <a:effectRef idx="0">
-            <a:schemeClr val="accent1"/>
+          <a:effectRef idx="1">
+            <a:schemeClr val="accent6"/>
           </a:effectRef>
           <a:fontRef idx="minor">
             <a:schemeClr val="lt1"/>
@@ -34670,8 +35031,8 @@
         </p:nvCxnSpPr>
         <p:spPr>
           <a:xfrm>
-            <a:off x="2949430" y="4402123"/>
-            <a:ext cx="4095227" cy="1569715"/>
+            <a:off x="3853779" y="4238538"/>
+            <a:ext cx="3051588" cy="1060499"/>
           </a:xfrm>
           <a:prstGeom prst="straightConnector1">
             <a:avLst/>
@@ -34707,7 +35068,7 @@
         </p:nvSpPr>
         <p:spPr>
           <a:xfrm>
-            <a:off x="7044657" y="5844880"/>
+            <a:off x="6905367" y="5172079"/>
             <a:ext cx="1775670" cy="253916"/>
           </a:xfrm>
           <a:prstGeom prst="rect">
@@ -34744,16 +35105,14 @@
           </a:prstGeom>
         </p:spPr>
         <p:style>
-          <a:lnRef idx="2">
-            <a:schemeClr val="accent1">
-              <a:shade val="50000"/>
-            </a:schemeClr>
+          <a:lnRef idx="3">
+            <a:schemeClr val="lt1"/>
           </a:lnRef>
           <a:fillRef idx="1">
-            <a:schemeClr val="accent1"/>
+            <a:schemeClr val="accent6"/>
           </a:fillRef>
-          <a:effectRef idx="0">
-            <a:schemeClr val="accent1"/>
+          <a:effectRef idx="1">
+            <a:schemeClr val="accent6"/>
           </a:effectRef>
           <a:fontRef idx="minor">
             <a:schemeClr val="lt1"/>
@@ -35032,6 +35391,227 @@
           </a:p>
         </p:txBody>
       </p:sp>
+      <p:grpSp>
+        <p:nvGrpSpPr>
+          <p:cNvPr id="51" name="Group 50"/>
+          <p:cNvGrpSpPr/>
+          <p:nvPr/>
+        </p:nvGrpSpPr>
+        <p:grpSpPr>
+          <a:xfrm>
+            <a:off x="494950" y="5904946"/>
+            <a:ext cx="2374085" cy="1237856"/>
+            <a:chOff x="7927596" y="452832"/>
+            <a:chExt cx="2374085" cy="1237856"/>
+          </a:xfrm>
+        </p:grpSpPr>
+        <p:sp>
+          <p:nvSpPr>
+            <p:cNvPr id="52" name="Rectangle 51"/>
+            <p:cNvSpPr/>
+            <p:nvPr/>
+          </p:nvSpPr>
+          <p:spPr>
+            <a:xfrm>
+              <a:off x="7927596" y="452832"/>
+              <a:ext cx="2189527" cy="1237856"/>
+            </a:xfrm>
+            <a:prstGeom prst="rect">
+              <a:avLst/>
+            </a:prstGeom>
+          </p:spPr>
+          <p:style>
+            <a:lnRef idx="2">
+              <a:schemeClr val="dk1"/>
+            </a:lnRef>
+            <a:fillRef idx="1">
+              <a:schemeClr val="lt1"/>
+            </a:fillRef>
+            <a:effectRef idx="0">
+              <a:schemeClr val="dk1"/>
+            </a:effectRef>
+            <a:fontRef idx="minor">
+              <a:schemeClr val="dk1"/>
+            </a:fontRef>
+          </p:style>
+          <p:txBody>
+            <a:bodyPr rtlCol="0" anchor="ctr"/>
+            <a:lstStyle/>
+            <a:p>
+              <a:pPr algn="ctr"/>
+              <a:endParaRPr lang="en-GB"/>
+            </a:p>
+          </p:txBody>
+        </p:sp>
+        <p:sp>
+          <p:nvSpPr>
+            <p:cNvPr id="53" name="Rectangle 52"/>
+            <p:cNvSpPr/>
+            <p:nvPr/>
+          </p:nvSpPr>
+          <p:spPr>
+            <a:xfrm>
+              <a:off x="8072747" y="867132"/>
+              <a:ext cx="425301" cy="321550"/>
+            </a:xfrm>
+            <a:prstGeom prst="rect">
+              <a:avLst/>
+            </a:prstGeom>
+          </p:spPr>
+          <p:style>
+            <a:lnRef idx="1">
+              <a:schemeClr val="accent6"/>
+            </a:lnRef>
+            <a:fillRef idx="3">
+              <a:schemeClr val="accent6"/>
+            </a:fillRef>
+            <a:effectRef idx="2">
+              <a:schemeClr val="accent6"/>
+            </a:effectRef>
+            <a:fontRef idx="minor">
+              <a:schemeClr val="lt1"/>
+            </a:fontRef>
+          </p:style>
+          <p:txBody>
+            <a:bodyPr rtlCol="0" anchor="t"/>
+            <a:lstStyle/>
+            <a:p>
+              <a:pPr algn="ctr"/>
+              <a:endParaRPr lang="en-GB" dirty="0"/>
+            </a:p>
+          </p:txBody>
+        </p:sp>
+        <p:sp>
+          <p:nvSpPr>
+            <p:cNvPr id="54" name="TextBox 53"/>
+            <p:cNvSpPr txBox="1"/>
+            <p:nvPr/>
+          </p:nvSpPr>
+          <p:spPr>
+            <a:xfrm>
+              <a:off x="7989631" y="452832"/>
+              <a:ext cx="581379" cy="369332"/>
+            </a:xfrm>
+            <a:prstGeom prst="rect">
+              <a:avLst/>
+            </a:prstGeom>
+            <a:noFill/>
+          </p:spPr>
+          <p:txBody>
+            <a:bodyPr wrap="square" rtlCol="0">
+              <a:spAutoFit/>
+            </a:bodyPr>
+            <a:lstStyle/>
+            <a:p>
+              <a:r>
+                <a:rPr lang="en-US"/>
+                <a:t>Key</a:t>
+              </a:r>
+              <a:endParaRPr lang="en-GB"/>
+            </a:p>
+          </p:txBody>
+        </p:sp>
+        <p:sp>
+          <p:nvSpPr>
+            <p:cNvPr id="55" name="TextBox 54"/>
+            <p:cNvSpPr txBox="1"/>
+            <p:nvPr/>
+          </p:nvSpPr>
+          <p:spPr>
+            <a:xfrm>
+              <a:off x="8550608" y="838899"/>
+              <a:ext cx="1751073" cy="369332"/>
+            </a:xfrm>
+            <a:prstGeom prst="rect">
+              <a:avLst/>
+            </a:prstGeom>
+            <a:noFill/>
+          </p:spPr>
+          <p:txBody>
+            <a:bodyPr wrap="square" rtlCol="0">
+              <a:spAutoFit/>
+            </a:bodyPr>
+            <a:lstStyle/>
+            <a:p>
+              <a:r>
+                <a:rPr lang="en-US"/>
+                <a:t>Existing Assets</a:t>
+              </a:r>
+              <a:endParaRPr lang="en-GB"/>
+            </a:p>
+          </p:txBody>
+        </p:sp>
+        <p:sp>
+          <p:nvSpPr>
+            <p:cNvPr id="56" name="Rectangle 55"/>
+            <p:cNvSpPr/>
+            <p:nvPr/>
+          </p:nvSpPr>
+          <p:spPr>
+            <a:xfrm>
+              <a:off x="8072747" y="1253617"/>
+              <a:ext cx="425301" cy="321550"/>
+            </a:xfrm>
+            <a:prstGeom prst="rect">
+              <a:avLst/>
+            </a:prstGeom>
+          </p:spPr>
+          <p:style>
+            <a:lnRef idx="2">
+              <a:schemeClr val="accent1">
+                <a:shade val="50000"/>
+              </a:schemeClr>
+            </a:lnRef>
+            <a:fillRef idx="1">
+              <a:schemeClr val="accent1"/>
+            </a:fillRef>
+            <a:effectRef idx="0">
+              <a:schemeClr val="accent1"/>
+            </a:effectRef>
+            <a:fontRef idx="minor">
+              <a:schemeClr val="lt1"/>
+            </a:fontRef>
+          </p:style>
+          <p:txBody>
+            <a:bodyPr rtlCol="0" anchor="t"/>
+            <a:lstStyle/>
+            <a:p>
+              <a:pPr algn="ctr"/>
+              <a:endParaRPr lang="en-GB" dirty="0"/>
+            </a:p>
+          </p:txBody>
+        </p:sp>
+        <p:sp>
+          <p:nvSpPr>
+            <p:cNvPr id="57" name="TextBox 56"/>
+            <p:cNvSpPr txBox="1"/>
+            <p:nvPr/>
+          </p:nvSpPr>
+          <p:spPr>
+            <a:xfrm>
+              <a:off x="8550608" y="1225384"/>
+              <a:ext cx="1751073" cy="369332"/>
+            </a:xfrm>
+            <a:prstGeom prst="rect">
+              <a:avLst/>
+            </a:prstGeom>
+            <a:noFill/>
+          </p:spPr>
+          <p:txBody>
+            <a:bodyPr wrap="square" rtlCol="0">
+              <a:spAutoFit/>
+            </a:bodyPr>
+            <a:lstStyle/>
+            <a:p>
+              <a:r>
+                <a:rPr lang="en-US"/>
+                <a:t>New Assets</a:t>
+              </a:r>
+              <a:endParaRPr lang="en-GB"/>
+            </a:p>
+          </p:txBody>
+        </p:sp>
+      </p:grpSp>
     </p:spTree>
     <p:extLst>
       <p:ext uri="{BB962C8B-B14F-4D97-AF65-F5344CB8AC3E}">

</xml_diff>

<commit_message>
RDMPDEV-1451 Deleted redundant / out of date documentation
</commit_message>
<xml_diff>
--- a/Documentation/RDMPUniverse.pptx
+++ b/Documentation/RDMPUniverse.pptx
@@ -5,18 +5,17 @@
     <p:sldMasterId id="2147483648" r:id="rId1"/>
   </p:sldMasterIdLst>
   <p:notesMasterIdLst>
-    <p:notesMasterId r:id="rId11"/>
+    <p:notesMasterId r:id="rId10"/>
   </p:notesMasterIdLst>
   <p:sldIdLst>
     <p:sldId id="262" r:id="rId2"/>
     <p:sldId id="263" r:id="rId3"/>
-    <p:sldId id="256" r:id="rId4"/>
-    <p:sldId id="257" r:id="rId5"/>
-    <p:sldId id="264" r:id="rId6"/>
-    <p:sldId id="261" r:id="rId7"/>
-    <p:sldId id="258" r:id="rId8"/>
-    <p:sldId id="259" r:id="rId9"/>
-    <p:sldId id="260" r:id="rId10"/>
+    <p:sldId id="257" r:id="rId4"/>
+    <p:sldId id="264" r:id="rId5"/>
+    <p:sldId id="261" r:id="rId6"/>
+    <p:sldId id="258" r:id="rId7"/>
+    <p:sldId id="259" r:id="rId8"/>
+    <p:sldId id="260" r:id="rId9"/>
   </p:sldIdLst>
   <p:sldSz cx="12192000" cy="6858000"/>
   <p:notesSz cx="6858000" cy="9144000"/>
@@ -37542,7 +37541,7 @@
           <a:p>
             <a:fld id="{DFF83554-E58E-427A-AA44-76F2B1DA92C2}" type="datetimeFigureOut">
               <a:rPr lang="en-GB" smtClean="0"/>
-              <a:t>05/11/2018</a:t>
+              <a:t>14/06/2019</a:t>
             </a:fld>
             <a:endParaRPr lang="en-GB" dirty="0"/>
           </a:p>
@@ -37875,7 +37874,7 @@
           <a:p>
             <a:fld id="{EE3BBC52-ABBD-4F4C-AF69-27CD2273FA71}" type="slidenum">
               <a:rPr lang="en-GB" smtClean="0"/>
-              <a:t>4</a:t>
+              <a:t>3</a:t>
             </a:fld>
             <a:endParaRPr lang="en-GB" dirty="0"/>
           </a:p>
@@ -37959,7 +37958,7 @@
           <a:p>
             <a:fld id="{EE3BBC52-ABBD-4F4C-AF69-27CD2273FA71}" type="slidenum">
               <a:rPr lang="en-GB" smtClean="0"/>
-              <a:t>6</a:t>
+              <a:t>5</a:t>
             </a:fld>
             <a:endParaRPr lang="en-GB" dirty="0"/>
           </a:p>
@@ -38043,7 +38042,7 @@
           <a:p>
             <a:fld id="{EE3BBC52-ABBD-4F4C-AF69-27CD2273FA71}" type="slidenum">
               <a:rPr lang="en-GB" smtClean="0"/>
-              <a:t>7</a:t>
+              <a:t>6</a:t>
             </a:fld>
             <a:endParaRPr lang="en-GB" dirty="0"/>
           </a:p>
@@ -38193,7 +38192,7 @@
           <a:p>
             <a:fld id="{1181E1B5-2943-42CC-8B73-D17041E08522}" type="datetimeFigureOut">
               <a:rPr lang="en-GB" smtClean="0"/>
-              <a:t>05/11/2018</a:t>
+              <a:t>14/06/2019</a:t>
             </a:fld>
             <a:endParaRPr lang="en-GB" dirty="0"/>
           </a:p>
@@ -38363,7 +38362,7 @@
           <a:p>
             <a:fld id="{1181E1B5-2943-42CC-8B73-D17041E08522}" type="datetimeFigureOut">
               <a:rPr lang="en-GB" smtClean="0"/>
-              <a:t>05/11/2018</a:t>
+              <a:t>14/06/2019</a:t>
             </a:fld>
             <a:endParaRPr lang="en-GB" dirty="0"/>
           </a:p>
@@ -38543,7 +38542,7 @@
           <a:p>
             <a:fld id="{1181E1B5-2943-42CC-8B73-D17041E08522}" type="datetimeFigureOut">
               <a:rPr lang="en-GB" smtClean="0"/>
-              <a:t>05/11/2018</a:t>
+              <a:t>14/06/2019</a:t>
             </a:fld>
             <a:endParaRPr lang="en-GB" dirty="0"/>
           </a:p>
@@ -38713,7 +38712,7 @@
           <a:p>
             <a:fld id="{1181E1B5-2943-42CC-8B73-D17041E08522}" type="datetimeFigureOut">
               <a:rPr lang="en-GB" smtClean="0"/>
-              <a:t>05/11/2018</a:t>
+              <a:t>14/06/2019</a:t>
             </a:fld>
             <a:endParaRPr lang="en-GB" dirty="0"/>
           </a:p>
@@ -38959,7 +38958,7 @@
           <a:p>
             <a:fld id="{1181E1B5-2943-42CC-8B73-D17041E08522}" type="datetimeFigureOut">
               <a:rPr lang="en-GB" smtClean="0"/>
-              <a:t>05/11/2018</a:t>
+              <a:t>14/06/2019</a:t>
             </a:fld>
             <a:endParaRPr lang="en-GB" dirty="0"/>
           </a:p>
@@ -39191,7 +39190,7 @@
           <a:p>
             <a:fld id="{1181E1B5-2943-42CC-8B73-D17041E08522}" type="datetimeFigureOut">
               <a:rPr lang="en-GB" smtClean="0"/>
-              <a:t>05/11/2018</a:t>
+              <a:t>14/06/2019</a:t>
             </a:fld>
             <a:endParaRPr lang="en-GB" dirty="0"/>
           </a:p>
@@ -39558,7 +39557,7 @@
           <a:p>
             <a:fld id="{1181E1B5-2943-42CC-8B73-D17041E08522}" type="datetimeFigureOut">
               <a:rPr lang="en-GB" smtClean="0"/>
-              <a:t>05/11/2018</a:t>
+              <a:t>14/06/2019</a:t>
             </a:fld>
             <a:endParaRPr lang="en-GB" dirty="0"/>
           </a:p>
@@ -39676,7 +39675,7 @@
           <a:p>
             <a:fld id="{1181E1B5-2943-42CC-8B73-D17041E08522}" type="datetimeFigureOut">
               <a:rPr lang="en-GB" smtClean="0"/>
-              <a:t>05/11/2018</a:t>
+              <a:t>14/06/2019</a:t>
             </a:fld>
             <a:endParaRPr lang="en-GB" dirty="0"/>
           </a:p>
@@ -39771,7 +39770,7 @@
           <a:p>
             <a:fld id="{1181E1B5-2943-42CC-8B73-D17041E08522}" type="datetimeFigureOut">
               <a:rPr lang="en-GB" smtClean="0"/>
-              <a:t>05/11/2018</a:t>
+              <a:t>14/06/2019</a:t>
             </a:fld>
             <a:endParaRPr lang="en-GB" dirty="0"/>
           </a:p>
@@ -40048,7 +40047,7 @@
           <a:p>
             <a:fld id="{1181E1B5-2943-42CC-8B73-D17041E08522}" type="datetimeFigureOut">
               <a:rPr lang="en-GB" smtClean="0"/>
-              <a:t>05/11/2018</a:t>
+              <a:t>14/06/2019</a:t>
             </a:fld>
             <a:endParaRPr lang="en-GB" dirty="0"/>
           </a:p>
@@ -40301,7 +40300,7 @@
           <a:p>
             <a:fld id="{1181E1B5-2943-42CC-8B73-D17041E08522}" type="datetimeFigureOut">
               <a:rPr lang="en-GB" smtClean="0"/>
-              <a:t>05/11/2018</a:t>
+              <a:t>14/06/2019</a:t>
             </a:fld>
             <a:endParaRPr lang="en-GB" dirty="0"/>
           </a:p>
@@ -40514,7 +40513,7 @@
           <a:p>
             <a:fld id="{1181E1B5-2943-42CC-8B73-D17041E08522}" type="datetimeFigureOut">
               <a:rPr lang="en-GB" smtClean="0"/>
-              <a:t>05/11/2018</a:t>
+              <a:t>14/06/2019</a:t>
             </a:fld>
             <a:endParaRPr lang="en-GB" dirty="0"/>
           </a:p>
@@ -42830,2405 +42829,6 @@
           <a:chExt cx="0" cy="0"/>
         </a:xfrm>
       </p:grpSpPr>
-      <p:sp>
-        <p:nvSpPr>
-          <p:cNvPr id="42" name="Rectangle 41"/>
-          <p:cNvSpPr/>
-          <p:nvPr/>
-        </p:nvSpPr>
-        <p:spPr>
-          <a:xfrm>
-            <a:off x="619124" y="5336959"/>
-            <a:ext cx="4205156" cy="932463"/>
-          </a:xfrm>
-          <a:prstGeom prst="rect">
-            <a:avLst/>
-          </a:prstGeom>
-        </p:spPr>
-        <p:style>
-          <a:lnRef idx="1">
-            <a:schemeClr val="accent1"/>
-          </a:lnRef>
-          <a:fillRef idx="2">
-            <a:schemeClr val="accent1"/>
-          </a:fillRef>
-          <a:effectRef idx="1">
-            <a:schemeClr val="accent1"/>
-          </a:effectRef>
-          <a:fontRef idx="minor">
-            <a:schemeClr val="dk1"/>
-          </a:fontRef>
-        </p:style>
-        <p:txBody>
-          <a:bodyPr rtlCol="0" anchor="ctr"/>
-          <a:lstStyle/>
-          <a:p>
-            <a:pPr algn="ctr"/>
-            <a:endParaRPr lang="en-GB" dirty="0"/>
-          </a:p>
-        </p:txBody>
-      </p:sp>
-      <p:sp>
-        <p:nvSpPr>
-          <p:cNvPr id="19" name="Rectangle 18"/>
-          <p:cNvSpPr/>
-          <p:nvPr/>
-        </p:nvSpPr>
-        <p:spPr>
-          <a:xfrm>
-            <a:off x="2589421" y="3526589"/>
-            <a:ext cx="3871899" cy="1323517"/>
-          </a:xfrm>
-          <a:prstGeom prst="rect">
-            <a:avLst/>
-          </a:prstGeom>
-        </p:spPr>
-        <p:style>
-          <a:lnRef idx="1">
-            <a:schemeClr val="accent2"/>
-          </a:lnRef>
-          <a:fillRef idx="2">
-            <a:schemeClr val="accent2"/>
-          </a:fillRef>
-          <a:effectRef idx="1">
-            <a:schemeClr val="accent2"/>
-          </a:effectRef>
-          <a:fontRef idx="minor">
-            <a:schemeClr val="dk1"/>
-          </a:fontRef>
-        </p:style>
-        <p:txBody>
-          <a:bodyPr rtlCol="0" anchor="ctr"/>
-          <a:lstStyle/>
-          <a:p>
-            <a:pPr algn="ctr"/>
-            <a:endParaRPr lang="en-GB" dirty="0"/>
-          </a:p>
-        </p:txBody>
-      </p:sp>
-      <p:pic>
-        <p:nvPicPr>
-          <p:cNvPr id="4" name="Picture 3"/>
-          <p:cNvPicPr/>
-          <p:nvPr/>
-        </p:nvPicPr>
-        <p:blipFill>
-          <a:blip r:embed="rId2"/>
-          <a:stretch>
-            <a:fillRect/>
-          </a:stretch>
-        </p:blipFill>
-        <p:spPr>
-          <a:xfrm>
-            <a:off x="2955490" y="4164455"/>
-            <a:ext cx="310515" cy="310515"/>
-          </a:xfrm>
-          <a:prstGeom prst="rect">
-            <a:avLst/>
-          </a:prstGeom>
-        </p:spPr>
-      </p:pic>
-      <p:pic>
-        <p:nvPicPr>
-          <p:cNvPr id="6" name="Picture 5"/>
-          <p:cNvPicPr/>
-          <p:nvPr/>
-        </p:nvPicPr>
-        <p:blipFill>
-          <a:blip r:embed="rId3"/>
-          <a:stretch>
-            <a:fillRect/>
-          </a:stretch>
-        </p:blipFill>
-        <p:spPr>
-          <a:xfrm>
-            <a:off x="4081724" y="3584968"/>
-            <a:ext cx="310515" cy="269240"/>
-          </a:xfrm>
-          <a:prstGeom prst="rect">
-            <a:avLst/>
-          </a:prstGeom>
-        </p:spPr>
-      </p:pic>
-      <p:pic>
-        <p:nvPicPr>
-          <p:cNvPr id="8" name="Picture 7"/>
-          <p:cNvPicPr/>
-          <p:nvPr/>
-        </p:nvPicPr>
-        <p:blipFill>
-          <a:blip r:embed="rId4"/>
-          <a:stretch>
-            <a:fillRect/>
-          </a:stretch>
-        </p:blipFill>
-        <p:spPr>
-          <a:xfrm>
-            <a:off x="4080565" y="4174377"/>
-            <a:ext cx="369570" cy="333375"/>
-          </a:xfrm>
-          <a:prstGeom prst="rect">
-            <a:avLst/>
-          </a:prstGeom>
-        </p:spPr>
-      </p:pic>
-      <p:pic>
-        <p:nvPicPr>
-          <p:cNvPr id="9" name="Picture 8"/>
-          <p:cNvPicPr/>
-          <p:nvPr/>
-        </p:nvPicPr>
-        <p:blipFill>
-          <a:blip r:embed="rId5"/>
-          <a:stretch>
-            <a:fillRect/>
-          </a:stretch>
-        </p:blipFill>
-        <p:spPr>
-          <a:xfrm>
-            <a:off x="2882498" y="3600606"/>
-            <a:ext cx="419100" cy="419100"/>
-          </a:xfrm>
-          <a:prstGeom prst="rect">
-            <a:avLst/>
-          </a:prstGeom>
-        </p:spPr>
-      </p:pic>
-      <p:sp>
-        <p:nvSpPr>
-          <p:cNvPr id="10" name="Rectangle 9"/>
-          <p:cNvSpPr/>
-          <p:nvPr/>
-        </p:nvSpPr>
-        <p:spPr>
-          <a:xfrm>
-            <a:off x="285708" y="1114699"/>
-            <a:ext cx="5022847" cy="1830703"/>
-          </a:xfrm>
-          <a:prstGeom prst="rect">
-            <a:avLst/>
-          </a:prstGeom>
-        </p:spPr>
-        <p:style>
-          <a:lnRef idx="1">
-            <a:schemeClr val="accent1"/>
-          </a:lnRef>
-          <a:fillRef idx="2">
-            <a:schemeClr val="accent1"/>
-          </a:fillRef>
-          <a:effectRef idx="1">
-            <a:schemeClr val="accent1"/>
-          </a:effectRef>
-          <a:fontRef idx="minor">
-            <a:schemeClr val="dk1"/>
-          </a:fontRef>
-        </p:style>
-        <p:txBody>
-          <a:bodyPr rtlCol="0" anchor="ctr"/>
-          <a:lstStyle/>
-          <a:p>
-            <a:pPr algn="ctr"/>
-            <a:endParaRPr lang="en-GB" dirty="0"/>
-          </a:p>
-        </p:txBody>
-      </p:sp>
-      <p:sp>
-        <p:nvSpPr>
-          <p:cNvPr id="11" name="TextBox 10"/>
-          <p:cNvSpPr txBox="1"/>
-          <p:nvPr/>
-        </p:nvSpPr>
-        <p:spPr>
-          <a:xfrm>
-            <a:off x="1338947" y="830164"/>
-            <a:ext cx="3609800" cy="369332"/>
-          </a:xfrm>
-          <a:prstGeom prst="rect">
-            <a:avLst/>
-          </a:prstGeom>
-          <a:noFill/>
-        </p:spPr>
-        <p:txBody>
-          <a:bodyPr wrap="square" rtlCol="0">
-            <a:spAutoFit/>
-          </a:bodyPr>
-          <a:lstStyle/>
-          <a:p>
-            <a:r>
-              <a:rPr lang="en-US" dirty="0"/>
-              <a:t>Platform Databases (SQL Server 1)</a:t>
-            </a:r>
-            <a:endParaRPr lang="en-GB" dirty="0"/>
-          </a:p>
-        </p:txBody>
-      </p:sp>
-      <p:pic>
-        <p:nvPicPr>
-          <p:cNvPr id="14" name="Picture 13"/>
-          <p:cNvPicPr>
-            <a:picLocks noChangeAspect="1"/>
-          </p:cNvPicPr>
-          <p:nvPr/>
-        </p:nvPicPr>
-        <p:blipFill>
-          <a:blip r:embed="rId6"/>
-          <a:stretch>
-            <a:fillRect/>
-          </a:stretch>
-        </p:blipFill>
-        <p:spPr>
-          <a:xfrm>
-            <a:off x="2057196" y="1299805"/>
-            <a:ext cx="400805" cy="420262"/>
-          </a:xfrm>
-          <a:prstGeom prst="rect">
-            <a:avLst/>
-          </a:prstGeom>
-        </p:spPr>
-      </p:pic>
-      <p:sp>
-        <p:nvSpPr>
-          <p:cNvPr id="15" name="TextBox 14"/>
-          <p:cNvSpPr txBox="1"/>
-          <p:nvPr/>
-        </p:nvSpPr>
-        <p:spPr>
-          <a:xfrm>
-            <a:off x="1366971" y="1653627"/>
-            <a:ext cx="1781258" cy="430887"/>
-          </a:xfrm>
-          <a:prstGeom prst="rect">
-            <a:avLst/>
-          </a:prstGeom>
-          <a:noFill/>
-        </p:spPr>
-        <p:txBody>
-          <a:bodyPr wrap="none" rtlCol="0">
-            <a:spAutoFit/>
-          </a:bodyPr>
-          <a:lstStyle/>
-          <a:p>
-            <a:pPr algn="ctr"/>
-            <a:r>
-              <a:rPr lang="en-US" sz="1100" dirty="0"/>
-              <a:t>Catalogue</a:t>
-            </a:r>
-          </a:p>
-          <a:p>
-            <a:pPr algn="ctr"/>
-            <a:r>
-              <a:rPr lang="en-US" sz="1100" dirty="0"/>
-              <a:t>(dataset configuration data)</a:t>
-            </a:r>
-            <a:endParaRPr lang="en-GB" sz="1100" dirty="0"/>
-          </a:p>
-        </p:txBody>
-      </p:sp>
-      <p:pic>
-        <p:nvPicPr>
-          <p:cNvPr id="16" name="Picture 15"/>
-          <p:cNvPicPr>
-            <a:picLocks noChangeAspect="1"/>
-          </p:cNvPicPr>
-          <p:nvPr/>
-        </p:nvPicPr>
-        <p:blipFill>
-          <a:blip r:embed="rId6"/>
-          <a:stretch>
-            <a:fillRect/>
-          </a:stretch>
-        </p:blipFill>
-        <p:spPr>
-          <a:xfrm>
-            <a:off x="3907593" y="1233365"/>
-            <a:ext cx="400805" cy="420262"/>
-          </a:xfrm>
-          <a:prstGeom prst="rect">
-            <a:avLst/>
-          </a:prstGeom>
-        </p:spPr>
-      </p:pic>
-      <p:sp>
-        <p:nvSpPr>
-          <p:cNvPr id="17" name="TextBox 16"/>
-          <p:cNvSpPr txBox="1"/>
-          <p:nvPr/>
-        </p:nvSpPr>
-        <p:spPr>
-          <a:xfrm>
-            <a:off x="3037028" y="1653626"/>
-            <a:ext cx="2141933" cy="430887"/>
-          </a:xfrm>
-          <a:prstGeom prst="rect">
-            <a:avLst/>
-          </a:prstGeom>
-          <a:noFill/>
-        </p:spPr>
-        <p:txBody>
-          <a:bodyPr wrap="none" rtlCol="0">
-            <a:spAutoFit/>
-          </a:bodyPr>
-          <a:lstStyle/>
-          <a:p>
-            <a:pPr algn="ctr"/>
-            <a:r>
-              <a:rPr lang="en-US" sz="1100" dirty="0"/>
-              <a:t>DataExport</a:t>
-            </a:r>
-          </a:p>
-          <a:p>
-            <a:pPr algn="ctr"/>
-            <a:r>
-              <a:rPr lang="en-US" sz="1100" dirty="0"/>
-              <a:t>(project extraction configurations)</a:t>
-            </a:r>
-            <a:endParaRPr lang="en-GB" sz="1100" dirty="0"/>
-          </a:p>
-        </p:txBody>
-      </p:sp>
-      <p:sp>
-        <p:nvSpPr>
-          <p:cNvPr id="18" name="Rectangle 17"/>
-          <p:cNvSpPr/>
-          <p:nvPr/>
-        </p:nvSpPr>
-        <p:spPr>
-          <a:xfrm>
-            <a:off x="4916523" y="5336959"/>
-            <a:ext cx="3517557" cy="1399905"/>
-          </a:xfrm>
-          <a:prstGeom prst="rect">
-            <a:avLst/>
-          </a:prstGeom>
-        </p:spPr>
-        <p:style>
-          <a:lnRef idx="1">
-            <a:schemeClr val="accent1"/>
-          </a:lnRef>
-          <a:fillRef idx="2">
-            <a:schemeClr val="accent1"/>
-          </a:fillRef>
-          <a:effectRef idx="1">
-            <a:schemeClr val="accent1"/>
-          </a:effectRef>
-          <a:fontRef idx="minor">
-            <a:schemeClr val="dk1"/>
-          </a:fontRef>
-        </p:style>
-        <p:txBody>
-          <a:bodyPr rtlCol="0" anchor="ctr"/>
-          <a:lstStyle/>
-          <a:p>
-            <a:pPr algn="ctr"/>
-            <a:endParaRPr lang="en-GB" dirty="0"/>
-          </a:p>
-        </p:txBody>
-      </p:sp>
-      <p:sp>
-        <p:nvSpPr>
-          <p:cNvPr id="20" name="TextBox 19"/>
-          <p:cNvSpPr txBox="1"/>
-          <p:nvPr/>
-        </p:nvSpPr>
-        <p:spPr>
-          <a:xfrm>
-            <a:off x="2922385" y="3201199"/>
-            <a:ext cx="3609800" cy="369332"/>
-          </a:xfrm>
-          <a:prstGeom prst="rect">
-            <a:avLst/>
-          </a:prstGeom>
-          <a:noFill/>
-        </p:spPr>
-        <p:txBody>
-          <a:bodyPr wrap="square" rtlCol="0">
-            <a:spAutoFit/>
-          </a:bodyPr>
-          <a:lstStyle/>
-          <a:p>
-            <a:r>
-              <a:rPr lang="en-US" dirty="0"/>
-              <a:t>Data Analyst PC</a:t>
-            </a:r>
-            <a:endParaRPr lang="en-GB" dirty="0"/>
-          </a:p>
-        </p:txBody>
-      </p:sp>
-      <p:pic>
-        <p:nvPicPr>
-          <p:cNvPr id="21" name="Picture 20"/>
-          <p:cNvPicPr>
-            <a:picLocks noChangeAspect="1"/>
-          </p:cNvPicPr>
-          <p:nvPr/>
-        </p:nvPicPr>
-        <p:blipFill>
-          <a:blip r:embed="rId6"/>
-          <a:stretch>
-            <a:fillRect/>
-          </a:stretch>
-        </p:blipFill>
-        <p:spPr>
-          <a:xfrm>
-            <a:off x="2057196" y="2161312"/>
-            <a:ext cx="400805" cy="420262"/>
-          </a:xfrm>
-          <a:prstGeom prst="rect">
-            <a:avLst/>
-          </a:prstGeom>
-        </p:spPr>
-      </p:pic>
-      <p:sp>
-        <p:nvSpPr>
-          <p:cNvPr id="22" name="TextBox 21"/>
-          <p:cNvSpPr txBox="1"/>
-          <p:nvPr/>
-        </p:nvSpPr>
-        <p:spPr>
-          <a:xfrm>
-            <a:off x="1417470" y="2515134"/>
-            <a:ext cx="1680268" cy="430887"/>
-          </a:xfrm>
-          <a:prstGeom prst="rect">
-            <a:avLst/>
-          </a:prstGeom>
-          <a:noFill/>
-        </p:spPr>
-        <p:txBody>
-          <a:bodyPr wrap="none" rtlCol="0">
-            <a:spAutoFit/>
-          </a:bodyPr>
-          <a:lstStyle/>
-          <a:p>
-            <a:pPr algn="ctr"/>
-            <a:r>
-              <a:rPr lang="en-US" sz="1100" dirty="0"/>
-              <a:t>Logging</a:t>
-            </a:r>
-          </a:p>
-          <a:p>
-            <a:pPr algn="ctr"/>
-            <a:r>
-              <a:rPr lang="en-US" sz="1100" dirty="0"/>
-              <a:t>(log of all RDMP activities)</a:t>
-            </a:r>
-          </a:p>
-        </p:txBody>
-      </p:sp>
-      <p:pic>
-        <p:nvPicPr>
-          <p:cNvPr id="23" name="Picture 22"/>
-          <p:cNvPicPr>
-            <a:picLocks noChangeAspect="1"/>
-          </p:cNvPicPr>
-          <p:nvPr/>
-        </p:nvPicPr>
-        <p:blipFill>
-          <a:blip r:embed="rId6"/>
-          <a:stretch>
-            <a:fillRect/>
-          </a:stretch>
-        </p:blipFill>
-        <p:spPr>
-          <a:xfrm>
-            <a:off x="7596320" y="5436924"/>
-            <a:ext cx="400805" cy="420262"/>
-          </a:xfrm>
-          <a:prstGeom prst="rect">
-            <a:avLst/>
-          </a:prstGeom>
-        </p:spPr>
-      </p:pic>
-      <p:sp>
-        <p:nvSpPr>
-          <p:cNvPr id="24" name="TextBox 23"/>
-          <p:cNvSpPr txBox="1"/>
-          <p:nvPr/>
-        </p:nvSpPr>
-        <p:spPr>
-          <a:xfrm>
-            <a:off x="7159372" y="5790746"/>
-            <a:ext cx="1274708" cy="600164"/>
-          </a:xfrm>
-          <a:prstGeom prst="rect">
-            <a:avLst/>
-          </a:prstGeom>
-          <a:noFill/>
-        </p:spPr>
-        <p:txBody>
-          <a:bodyPr wrap="none" rtlCol="0">
-            <a:spAutoFit/>
-          </a:bodyPr>
-          <a:lstStyle/>
-          <a:p>
-            <a:pPr algn="ctr"/>
-            <a:r>
-              <a:rPr lang="en-US" sz="1100" dirty="0"/>
-              <a:t>Cohorts</a:t>
-            </a:r>
-          </a:p>
-          <a:p>
-            <a:pPr algn="ctr"/>
-            <a:r>
-              <a:rPr lang="en-US" sz="1100" dirty="0"/>
-              <a:t>(Patients you have </a:t>
-            </a:r>
-          </a:p>
-          <a:p>
-            <a:pPr algn="ctr"/>
-            <a:r>
-              <a:rPr lang="en-US" sz="1100" dirty="0"/>
-              <a:t>Released data for)</a:t>
-            </a:r>
-          </a:p>
-        </p:txBody>
-      </p:sp>
-      <p:pic>
-        <p:nvPicPr>
-          <p:cNvPr id="30" name="Picture 29"/>
-          <p:cNvPicPr>
-            <a:picLocks noChangeAspect="1"/>
-          </p:cNvPicPr>
-          <p:nvPr/>
-        </p:nvPicPr>
-        <p:blipFill>
-          <a:blip r:embed="rId6"/>
-          <a:stretch>
-            <a:fillRect/>
-          </a:stretch>
-        </p:blipFill>
-        <p:spPr>
-          <a:xfrm>
-            <a:off x="5211605" y="5436924"/>
-            <a:ext cx="400805" cy="420262"/>
-          </a:xfrm>
-          <a:prstGeom prst="rect">
-            <a:avLst/>
-          </a:prstGeom>
-        </p:spPr>
-      </p:pic>
-      <p:sp>
-        <p:nvSpPr>
-          <p:cNvPr id="31" name="TextBox 30"/>
-          <p:cNvSpPr txBox="1"/>
-          <p:nvPr/>
-        </p:nvSpPr>
-        <p:spPr>
-          <a:xfrm>
-            <a:off x="4916524" y="5790746"/>
-            <a:ext cx="990976" cy="261610"/>
-          </a:xfrm>
-          <a:prstGeom prst="rect">
-            <a:avLst/>
-          </a:prstGeom>
-          <a:noFill/>
-        </p:spPr>
-        <p:txBody>
-          <a:bodyPr wrap="none" rtlCol="0">
-            <a:spAutoFit/>
-          </a:bodyPr>
-          <a:lstStyle/>
-          <a:p>
-            <a:pPr algn="ctr"/>
-            <a:r>
-              <a:rPr lang="en-US" sz="1100" dirty="0"/>
-              <a:t>DLE_STAGING</a:t>
-            </a:r>
-          </a:p>
-        </p:txBody>
-      </p:sp>
-      <p:pic>
-        <p:nvPicPr>
-          <p:cNvPr id="32" name="Picture 31"/>
-          <p:cNvPicPr>
-            <a:picLocks noChangeAspect="1"/>
-          </p:cNvPicPr>
-          <p:nvPr/>
-        </p:nvPicPr>
-        <p:blipFill>
-          <a:blip r:embed="rId6"/>
-          <a:stretch>
-            <a:fillRect/>
-          </a:stretch>
-        </p:blipFill>
-        <p:spPr>
-          <a:xfrm>
-            <a:off x="4080565" y="5484713"/>
-            <a:ext cx="400805" cy="420262"/>
-          </a:xfrm>
-          <a:prstGeom prst="rect">
-            <a:avLst/>
-          </a:prstGeom>
-        </p:spPr>
-      </p:pic>
-      <p:sp>
-        <p:nvSpPr>
-          <p:cNvPr id="33" name="TextBox 32"/>
-          <p:cNvSpPr txBox="1"/>
-          <p:nvPr/>
-        </p:nvSpPr>
-        <p:spPr>
-          <a:xfrm>
-            <a:off x="3676479" y="5838535"/>
-            <a:ext cx="1208984" cy="430887"/>
-          </a:xfrm>
-          <a:prstGeom prst="rect">
-            <a:avLst/>
-          </a:prstGeom>
-          <a:noFill/>
-        </p:spPr>
-        <p:txBody>
-          <a:bodyPr wrap="none" rtlCol="0">
-            <a:spAutoFit/>
-          </a:bodyPr>
-          <a:lstStyle/>
-          <a:p>
-            <a:pPr algn="ctr"/>
-            <a:r>
-              <a:rPr lang="en-US" sz="1100" dirty="0"/>
-              <a:t>RAW</a:t>
-            </a:r>
-          </a:p>
-          <a:p>
-            <a:pPr algn="ctr"/>
-            <a:r>
-              <a:rPr lang="en-US" sz="1100" dirty="0"/>
-              <a:t>(Identifiable data)</a:t>
-            </a:r>
-          </a:p>
-        </p:txBody>
-      </p:sp>
-      <p:pic>
-        <p:nvPicPr>
-          <p:cNvPr id="34" name="Picture 33"/>
-          <p:cNvPicPr>
-            <a:picLocks noChangeAspect="1"/>
-          </p:cNvPicPr>
-          <p:nvPr/>
-        </p:nvPicPr>
-        <p:blipFill>
-          <a:blip r:embed="rId6"/>
-          <a:stretch>
-            <a:fillRect/>
-          </a:stretch>
-        </p:blipFill>
-        <p:spPr>
-          <a:xfrm>
-            <a:off x="6360236" y="5436924"/>
-            <a:ext cx="400805" cy="420262"/>
-          </a:xfrm>
-          <a:prstGeom prst="rect">
-            <a:avLst/>
-          </a:prstGeom>
-        </p:spPr>
-      </p:pic>
-      <p:sp>
-        <p:nvSpPr>
-          <p:cNvPr id="35" name="TextBox 34"/>
-          <p:cNvSpPr txBox="1"/>
-          <p:nvPr/>
-        </p:nvSpPr>
-        <p:spPr>
-          <a:xfrm>
-            <a:off x="5897639" y="5790746"/>
-            <a:ext cx="1326005" cy="430887"/>
-          </a:xfrm>
-          <a:prstGeom prst="rect">
-            <a:avLst/>
-          </a:prstGeom>
-          <a:noFill/>
-        </p:spPr>
-        <p:txBody>
-          <a:bodyPr wrap="none" rtlCol="0">
-            <a:spAutoFit/>
-          </a:bodyPr>
-          <a:lstStyle/>
-          <a:p>
-            <a:pPr algn="ctr"/>
-            <a:r>
-              <a:rPr lang="en-US" sz="1100" dirty="0"/>
-              <a:t>Agency Data</a:t>
-            </a:r>
-          </a:p>
-          <a:p>
-            <a:pPr algn="ctr"/>
-            <a:r>
-              <a:rPr lang="en-US" sz="1100" dirty="0"/>
-              <a:t>(Your LIVE datasets)</a:t>
-            </a:r>
-          </a:p>
-        </p:txBody>
-      </p:sp>
-      <p:pic>
-        <p:nvPicPr>
-          <p:cNvPr id="36" name="Picture 35"/>
-          <p:cNvPicPr>
-            <a:picLocks noChangeAspect="1"/>
-          </p:cNvPicPr>
-          <p:nvPr/>
-        </p:nvPicPr>
-        <p:blipFill>
-          <a:blip r:embed="rId6"/>
-          <a:stretch>
-            <a:fillRect/>
-          </a:stretch>
-        </p:blipFill>
-        <p:spPr>
-          <a:xfrm>
-            <a:off x="3201688" y="2126802"/>
-            <a:ext cx="400805" cy="420262"/>
-          </a:xfrm>
-          <a:prstGeom prst="rect">
-            <a:avLst/>
-          </a:prstGeom>
-        </p:spPr>
-      </p:pic>
-      <p:sp>
-        <p:nvSpPr>
-          <p:cNvPr id="37" name="TextBox 36"/>
-          <p:cNvSpPr txBox="1"/>
-          <p:nvPr/>
-        </p:nvSpPr>
-        <p:spPr>
-          <a:xfrm>
-            <a:off x="2734281" y="2480624"/>
-            <a:ext cx="1335623" cy="261610"/>
-          </a:xfrm>
-          <a:prstGeom prst="rect">
-            <a:avLst/>
-          </a:prstGeom>
-          <a:noFill/>
-        </p:spPr>
-        <p:txBody>
-          <a:bodyPr wrap="none" rtlCol="0">
-            <a:spAutoFit/>
-          </a:bodyPr>
-          <a:lstStyle/>
-          <a:p>
-            <a:pPr algn="ctr"/>
-            <a:r>
-              <a:rPr lang="en-US" sz="1100" dirty="0"/>
-              <a:t>Data Quality Results</a:t>
-            </a:r>
-          </a:p>
-        </p:txBody>
-      </p:sp>
-      <p:sp>
-        <p:nvSpPr>
-          <p:cNvPr id="38" name="Rectangle 37"/>
-          <p:cNvSpPr/>
-          <p:nvPr/>
-        </p:nvSpPr>
-        <p:spPr>
-          <a:xfrm>
-            <a:off x="5412505" y="1017207"/>
-            <a:ext cx="3917633" cy="1356714"/>
-          </a:xfrm>
-          <a:prstGeom prst="rect">
-            <a:avLst/>
-          </a:prstGeom>
-        </p:spPr>
-        <p:style>
-          <a:lnRef idx="1">
-            <a:schemeClr val="accent1"/>
-          </a:lnRef>
-          <a:fillRef idx="2">
-            <a:schemeClr val="accent1"/>
-          </a:fillRef>
-          <a:effectRef idx="1">
-            <a:schemeClr val="accent1"/>
-          </a:effectRef>
-          <a:fontRef idx="minor">
-            <a:schemeClr val="dk1"/>
-          </a:fontRef>
-        </p:style>
-        <p:txBody>
-          <a:bodyPr rtlCol="0" anchor="ctr"/>
-          <a:lstStyle/>
-          <a:p>
-            <a:pPr algn="ctr"/>
-            <a:endParaRPr lang="en-GB" dirty="0"/>
-          </a:p>
-        </p:txBody>
-      </p:sp>
-      <p:sp>
-        <p:nvSpPr>
-          <p:cNvPr id="39" name="TextBox 38"/>
-          <p:cNvSpPr txBox="1"/>
-          <p:nvPr/>
-        </p:nvSpPr>
-        <p:spPr>
-          <a:xfrm>
-            <a:off x="5369029" y="706104"/>
-            <a:ext cx="5213245" cy="369332"/>
-          </a:xfrm>
-          <a:prstGeom prst="rect">
-            <a:avLst/>
-          </a:prstGeom>
-          <a:noFill/>
-        </p:spPr>
-        <p:txBody>
-          <a:bodyPr wrap="square" rtlCol="0">
-            <a:spAutoFit/>
-          </a:bodyPr>
-          <a:lstStyle/>
-          <a:p>
-            <a:r>
-              <a:rPr lang="en-US" dirty="0"/>
-              <a:t>Anonymisation Databases – Optional (SQL Server 3)</a:t>
-            </a:r>
-            <a:endParaRPr lang="en-GB" dirty="0"/>
-          </a:p>
-        </p:txBody>
-      </p:sp>
-      <p:pic>
-        <p:nvPicPr>
-          <p:cNvPr id="25" name="Picture 24"/>
-          <p:cNvPicPr>
-            <a:picLocks noChangeAspect="1"/>
-          </p:cNvPicPr>
-          <p:nvPr/>
-        </p:nvPicPr>
-        <p:blipFill>
-          <a:blip r:embed="rId6"/>
-          <a:stretch>
-            <a:fillRect/>
-          </a:stretch>
-        </p:blipFill>
-        <p:spPr>
-          <a:xfrm>
-            <a:off x="5997534" y="1199496"/>
-            <a:ext cx="400805" cy="420262"/>
-          </a:xfrm>
-          <a:prstGeom prst="rect">
-            <a:avLst/>
-          </a:prstGeom>
-        </p:spPr>
-      </p:pic>
-      <p:sp>
-        <p:nvSpPr>
-          <p:cNvPr id="26" name="TextBox 25"/>
-          <p:cNvSpPr txBox="1"/>
-          <p:nvPr/>
-        </p:nvSpPr>
-        <p:spPr>
-          <a:xfrm>
-            <a:off x="5369030" y="1553318"/>
-            <a:ext cx="1657825" cy="430887"/>
-          </a:xfrm>
-          <a:prstGeom prst="rect">
-            <a:avLst/>
-          </a:prstGeom>
-          <a:noFill/>
-        </p:spPr>
-        <p:txBody>
-          <a:bodyPr wrap="none" rtlCol="0">
-            <a:spAutoFit/>
-          </a:bodyPr>
-          <a:lstStyle/>
-          <a:p>
-            <a:pPr algn="ctr"/>
-            <a:r>
-              <a:rPr lang="en-US" sz="1100" dirty="0"/>
-              <a:t>Anonymisation Identifiers</a:t>
-            </a:r>
-          </a:p>
-          <a:p>
-            <a:pPr algn="ctr"/>
-            <a:r>
-              <a:rPr lang="en-US" sz="1100" dirty="0"/>
-              <a:t>(OnLoad anonymisation)</a:t>
-            </a:r>
-          </a:p>
-        </p:txBody>
-      </p:sp>
-      <p:pic>
-        <p:nvPicPr>
-          <p:cNvPr id="40" name="Picture 39"/>
-          <p:cNvPicPr>
-            <a:picLocks noChangeAspect="1"/>
-          </p:cNvPicPr>
-          <p:nvPr/>
-        </p:nvPicPr>
-        <p:blipFill>
-          <a:blip r:embed="rId6"/>
-          <a:stretch>
-            <a:fillRect/>
-          </a:stretch>
-        </p:blipFill>
-        <p:spPr>
-          <a:xfrm>
-            <a:off x="7753168" y="1199496"/>
-            <a:ext cx="400805" cy="420262"/>
-          </a:xfrm>
-          <a:prstGeom prst="rect">
-            <a:avLst/>
-          </a:prstGeom>
-        </p:spPr>
-      </p:pic>
-      <p:sp>
-        <p:nvSpPr>
-          <p:cNvPr id="41" name="TextBox 40"/>
-          <p:cNvSpPr txBox="1"/>
-          <p:nvPr/>
-        </p:nvSpPr>
-        <p:spPr>
-          <a:xfrm>
-            <a:off x="7124671" y="1553318"/>
-            <a:ext cx="1657825" cy="430887"/>
-          </a:xfrm>
-          <a:prstGeom prst="rect">
-            <a:avLst/>
-          </a:prstGeom>
-          <a:noFill/>
-        </p:spPr>
-        <p:txBody>
-          <a:bodyPr wrap="none" rtlCol="0">
-            <a:spAutoFit/>
-          </a:bodyPr>
-          <a:lstStyle/>
-          <a:p>
-            <a:pPr algn="ctr"/>
-            <a:r>
-              <a:rPr lang="en-US" sz="1100" dirty="0"/>
-              <a:t>Dumped Identifiable Data</a:t>
-            </a:r>
-          </a:p>
-          <a:p>
-            <a:pPr algn="ctr"/>
-            <a:r>
-              <a:rPr lang="en-US" sz="1100" dirty="0"/>
-              <a:t>(Names/Addresses etc.)</a:t>
-            </a:r>
-          </a:p>
-        </p:txBody>
-      </p:sp>
-      <p:sp>
-        <p:nvSpPr>
-          <p:cNvPr id="45" name="Right Arrow 44"/>
-          <p:cNvSpPr/>
-          <p:nvPr/>
-        </p:nvSpPr>
-        <p:spPr>
-          <a:xfrm>
-            <a:off x="5553985" y="5647055"/>
-            <a:ext cx="918033" cy="129178"/>
-          </a:xfrm>
-          <a:prstGeom prst="rightArrow">
-            <a:avLst/>
-          </a:prstGeom>
-          <a:solidFill>
-            <a:schemeClr val="accent6">
-              <a:alpha val="51000"/>
-            </a:schemeClr>
-          </a:solidFill>
-          <a:ln>
-            <a:solidFill>
-              <a:schemeClr val="accent6">
-                <a:shade val="50000"/>
-                <a:alpha val="50000"/>
-              </a:schemeClr>
-            </a:solidFill>
-          </a:ln>
-        </p:spPr>
-        <p:style>
-          <a:lnRef idx="2">
-            <a:schemeClr val="accent6">
-              <a:shade val="50000"/>
-            </a:schemeClr>
-          </a:lnRef>
-          <a:fillRef idx="1">
-            <a:schemeClr val="accent6"/>
-          </a:fillRef>
-          <a:effectRef idx="0">
-            <a:schemeClr val="accent6"/>
-          </a:effectRef>
-          <a:fontRef idx="minor">
-            <a:schemeClr val="lt1"/>
-          </a:fontRef>
-        </p:style>
-        <p:txBody>
-          <a:bodyPr rtlCol="0" anchor="ctr"/>
-          <a:lstStyle/>
-          <a:p>
-            <a:pPr algn="ctr"/>
-            <a:endParaRPr lang="en-GB" dirty="0"/>
-          </a:p>
-        </p:txBody>
-      </p:sp>
-      <p:sp>
-        <p:nvSpPr>
-          <p:cNvPr id="48" name="Rectangle 47"/>
-          <p:cNvSpPr/>
-          <p:nvPr/>
-        </p:nvSpPr>
-        <p:spPr>
-          <a:xfrm>
-            <a:off x="285708" y="3371683"/>
-            <a:ext cx="2028305" cy="1555145"/>
-          </a:xfrm>
-          <a:prstGeom prst="rect">
-            <a:avLst/>
-          </a:prstGeom>
-        </p:spPr>
-        <p:style>
-          <a:lnRef idx="1">
-            <a:schemeClr val="accent4"/>
-          </a:lnRef>
-          <a:fillRef idx="2">
-            <a:schemeClr val="accent4"/>
-          </a:fillRef>
-          <a:effectRef idx="1">
-            <a:schemeClr val="accent4"/>
-          </a:effectRef>
-          <a:fontRef idx="minor">
-            <a:schemeClr val="dk1"/>
-          </a:fontRef>
-        </p:style>
-        <p:txBody>
-          <a:bodyPr rtlCol="0" anchor="ctr"/>
-          <a:lstStyle/>
-          <a:p>
-            <a:pPr algn="ctr"/>
-            <a:endParaRPr lang="en-GB" dirty="0"/>
-          </a:p>
-        </p:txBody>
-      </p:sp>
-      <p:sp>
-        <p:nvSpPr>
-          <p:cNvPr id="49" name="TextBox 48"/>
-          <p:cNvSpPr txBox="1"/>
-          <p:nvPr/>
-        </p:nvSpPr>
-        <p:spPr>
-          <a:xfrm>
-            <a:off x="142358" y="3030200"/>
-            <a:ext cx="3609800" cy="369332"/>
-          </a:xfrm>
-          <a:prstGeom prst="rect">
-            <a:avLst/>
-          </a:prstGeom>
-          <a:noFill/>
-        </p:spPr>
-        <p:txBody>
-          <a:bodyPr wrap="square" rtlCol="0">
-            <a:spAutoFit/>
-          </a:bodyPr>
-          <a:lstStyle/>
-          <a:p>
-            <a:r>
-              <a:rPr lang="en-US" dirty="0"/>
-              <a:t>Dataset Folders (File Server 1)</a:t>
-            </a:r>
-            <a:endParaRPr lang="en-GB" dirty="0"/>
-          </a:p>
-        </p:txBody>
-      </p:sp>
-      <p:sp>
-        <p:nvSpPr>
-          <p:cNvPr id="50" name="Rectangle 49"/>
-          <p:cNvSpPr/>
-          <p:nvPr/>
-        </p:nvSpPr>
-        <p:spPr>
-          <a:xfrm>
-            <a:off x="8445295" y="3434779"/>
-            <a:ext cx="2028305" cy="1393664"/>
-          </a:xfrm>
-          <a:prstGeom prst="rect">
-            <a:avLst/>
-          </a:prstGeom>
-        </p:spPr>
-        <p:style>
-          <a:lnRef idx="1">
-            <a:schemeClr val="accent4"/>
-          </a:lnRef>
-          <a:fillRef idx="2">
-            <a:schemeClr val="accent4"/>
-          </a:fillRef>
-          <a:effectRef idx="1">
-            <a:schemeClr val="accent4"/>
-          </a:effectRef>
-          <a:fontRef idx="minor">
-            <a:schemeClr val="dk1"/>
-          </a:fontRef>
-        </p:style>
-        <p:txBody>
-          <a:bodyPr rtlCol="0" anchor="ctr"/>
-          <a:lstStyle/>
-          <a:p>
-            <a:pPr algn="ctr"/>
-            <a:endParaRPr lang="en-GB" dirty="0"/>
-          </a:p>
-        </p:txBody>
-      </p:sp>
-      <p:sp>
-        <p:nvSpPr>
-          <p:cNvPr id="51" name="TextBox 50"/>
-          <p:cNvSpPr txBox="1"/>
-          <p:nvPr/>
-        </p:nvSpPr>
-        <p:spPr>
-          <a:xfrm>
-            <a:off x="8301945" y="3093295"/>
-            <a:ext cx="3609800" cy="369332"/>
-          </a:xfrm>
-          <a:prstGeom prst="rect">
-            <a:avLst/>
-          </a:prstGeom>
-          <a:noFill/>
-        </p:spPr>
-        <p:txBody>
-          <a:bodyPr wrap="square" rtlCol="0">
-            <a:spAutoFit/>
-          </a:bodyPr>
-          <a:lstStyle/>
-          <a:p>
-            <a:r>
-              <a:rPr lang="en-US" dirty="0"/>
-              <a:t>Safe Haven Extracts (File Server 2)</a:t>
-            </a:r>
-            <a:endParaRPr lang="en-GB" dirty="0"/>
-          </a:p>
-        </p:txBody>
-      </p:sp>
-      <p:pic>
-        <p:nvPicPr>
-          <p:cNvPr id="52" name="Picture 51"/>
-          <p:cNvPicPr>
-            <a:picLocks noChangeAspect="1"/>
-          </p:cNvPicPr>
-          <p:nvPr/>
-        </p:nvPicPr>
-        <p:blipFill>
-          <a:blip r:embed="rId7"/>
-          <a:stretch>
-            <a:fillRect/>
-          </a:stretch>
-        </p:blipFill>
-        <p:spPr>
-          <a:xfrm>
-            <a:off x="1053738" y="4274722"/>
-            <a:ext cx="626466" cy="435045"/>
-          </a:xfrm>
-          <a:prstGeom prst="rect">
-            <a:avLst/>
-          </a:prstGeom>
-        </p:spPr>
-      </p:pic>
-      <p:pic>
-        <p:nvPicPr>
-          <p:cNvPr id="53" name="Picture 52"/>
-          <p:cNvPicPr>
-            <a:picLocks noChangeAspect="1"/>
-          </p:cNvPicPr>
-          <p:nvPr/>
-        </p:nvPicPr>
-        <p:blipFill>
-          <a:blip r:embed="rId7"/>
-          <a:stretch>
-            <a:fillRect/>
-          </a:stretch>
-        </p:blipFill>
-        <p:spPr>
-          <a:xfrm>
-            <a:off x="1086654" y="3445712"/>
-            <a:ext cx="626466" cy="435045"/>
-          </a:xfrm>
-          <a:prstGeom prst="rect">
-            <a:avLst/>
-          </a:prstGeom>
-        </p:spPr>
-      </p:pic>
-      <p:sp>
-        <p:nvSpPr>
-          <p:cNvPr id="54" name="TextBox 53"/>
-          <p:cNvSpPr txBox="1"/>
-          <p:nvPr/>
-        </p:nvSpPr>
-        <p:spPr>
-          <a:xfrm>
-            <a:off x="442037" y="3825240"/>
-            <a:ext cx="1872628" cy="430887"/>
-          </a:xfrm>
-          <a:prstGeom prst="rect">
-            <a:avLst/>
-          </a:prstGeom>
-          <a:noFill/>
-        </p:spPr>
-        <p:txBody>
-          <a:bodyPr wrap="none" rtlCol="0">
-            <a:spAutoFit/>
-          </a:bodyPr>
-          <a:lstStyle/>
-          <a:p>
-            <a:pPr algn="ctr"/>
-            <a:r>
-              <a:rPr lang="en-US" sz="1100" dirty="0"/>
-              <a:t>Attachments (e.g. third party </a:t>
-            </a:r>
-          </a:p>
-          <a:p>
-            <a:pPr algn="ctr"/>
-            <a:r>
-              <a:rPr lang="en-US" sz="1100" dirty="0"/>
-              <a:t>Metadata documents)</a:t>
-            </a:r>
-          </a:p>
-        </p:txBody>
-      </p:sp>
-      <p:sp>
-        <p:nvSpPr>
-          <p:cNvPr id="55" name="TextBox 54"/>
-          <p:cNvSpPr txBox="1"/>
-          <p:nvPr/>
-        </p:nvSpPr>
-        <p:spPr>
-          <a:xfrm>
-            <a:off x="487943" y="4645301"/>
-            <a:ext cx="1696298" cy="261610"/>
-          </a:xfrm>
-          <a:prstGeom prst="rect">
-            <a:avLst/>
-          </a:prstGeom>
-          <a:noFill/>
-        </p:spPr>
-        <p:txBody>
-          <a:bodyPr wrap="none" rtlCol="0">
-            <a:spAutoFit/>
-          </a:bodyPr>
-          <a:lstStyle/>
-          <a:p>
-            <a:pPr algn="ctr"/>
-            <a:r>
-              <a:rPr lang="en-US" sz="1100" dirty="0"/>
-              <a:t>Files you are trying to load</a:t>
-            </a:r>
-          </a:p>
-        </p:txBody>
-      </p:sp>
-      <p:sp>
-        <p:nvSpPr>
-          <p:cNvPr id="56" name="Right Arrow 55"/>
-          <p:cNvSpPr/>
-          <p:nvPr/>
-        </p:nvSpPr>
-        <p:spPr>
-          <a:xfrm rot="18532077">
-            <a:off x="3636041" y="3790847"/>
-            <a:ext cx="4479776" cy="172604"/>
-          </a:xfrm>
-          <a:prstGeom prst="rightArrow">
-            <a:avLst/>
-          </a:prstGeom>
-          <a:solidFill>
-            <a:schemeClr val="accent6">
-              <a:alpha val="51000"/>
-            </a:schemeClr>
-          </a:solidFill>
-          <a:ln>
-            <a:solidFill>
-              <a:schemeClr val="accent6">
-                <a:shade val="50000"/>
-                <a:alpha val="50000"/>
-              </a:schemeClr>
-            </a:solidFill>
-          </a:ln>
-        </p:spPr>
-        <p:style>
-          <a:lnRef idx="2">
-            <a:schemeClr val="accent6">
-              <a:shade val="50000"/>
-            </a:schemeClr>
-          </a:lnRef>
-          <a:fillRef idx="1">
-            <a:schemeClr val="accent6"/>
-          </a:fillRef>
-          <a:effectRef idx="0">
-            <a:schemeClr val="accent6"/>
-          </a:effectRef>
-          <a:fontRef idx="minor">
-            <a:schemeClr val="lt1"/>
-          </a:fontRef>
-        </p:style>
-        <p:txBody>
-          <a:bodyPr rtlCol="0" anchor="ctr"/>
-          <a:lstStyle/>
-          <a:p>
-            <a:pPr algn="ctr"/>
-            <a:endParaRPr lang="en-GB" dirty="0"/>
-          </a:p>
-        </p:txBody>
-      </p:sp>
-      <p:sp>
-        <p:nvSpPr>
-          <p:cNvPr id="46" name="Right Arrow 45"/>
-          <p:cNvSpPr/>
-          <p:nvPr/>
-        </p:nvSpPr>
-        <p:spPr>
-          <a:xfrm rot="1358621">
-            <a:off x="1416908" y="4999609"/>
-            <a:ext cx="2906750" cy="174095"/>
-          </a:xfrm>
-          <a:prstGeom prst="rightArrow">
-            <a:avLst/>
-          </a:prstGeom>
-          <a:solidFill>
-            <a:schemeClr val="accent6">
-              <a:alpha val="51000"/>
-            </a:schemeClr>
-          </a:solidFill>
-          <a:ln>
-            <a:solidFill>
-              <a:schemeClr val="accent6">
-                <a:shade val="50000"/>
-                <a:alpha val="50000"/>
-              </a:schemeClr>
-            </a:solidFill>
-          </a:ln>
-        </p:spPr>
-        <p:style>
-          <a:lnRef idx="2">
-            <a:schemeClr val="accent6">
-              <a:shade val="50000"/>
-            </a:schemeClr>
-          </a:lnRef>
-          <a:fillRef idx="1">
-            <a:schemeClr val="accent6"/>
-          </a:fillRef>
-          <a:effectRef idx="0">
-            <a:schemeClr val="accent6"/>
-          </a:effectRef>
-          <a:fontRef idx="minor">
-            <a:schemeClr val="lt1"/>
-          </a:fontRef>
-        </p:style>
-        <p:txBody>
-          <a:bodyPr rtlCol="0" anchor="ctr"/>
-          <a:lstStyle/>
-          <a:p>
-            <a:pPr algn="ctr"/>
-            <a:endParaRPr lang="en-GB" dirty="0"/>
-          </a:p>
-        </p:txBody>
-      </p:sp>
-      <p:sp>
-        <p:nvSpPr>
-          <p:cNvPr id="43" name="TextBox 42"/>
-          <p:cNvSpPr txBox="1"/>
-          <p:nvPr/>
-        </p:nvSpPr>
-        <p:spPr>
-          <a:xfrm>
-            <a:off x="539636" y="5021105"/>
-            <a:ext cx="4376887" cy="369332"/>
-          </a:xfrm>
-          <a:prstGeom prst="rect">
-            <a:avLst/>
-          </a:prstGeom>
-          <a:noFill/>
-        </p:spPr>
-        <p:txBody>
-          <a:bodyPr wrap="square" rtlCol="0">
-            <a:spAutoFit/>
-          </a:bodyPr>
-          <a:lstStyle/>
-          <a:p>
-            <a:r>
-              <a:rPr lang="en-US" dirty="0"/>
-              <a:t>Identifiable Data Load Server (SQL Server 4)</a:t>
-            </a:r>
-            <a:endParaRPr lang="en-GB" dirty="0"/>
-          </a:p>
-        </p:txBody>
-      </p:sp>
-      <p:sp>
-        <p:nvSpPr>
-          <p:cNvPr id="57" name="TextBox 56"/>
-          <p:cNvSpPr txBox="1"/>
-          <p:nvPr/>
-        </p:nvSpPr>
-        <p:spPr>
-          <a:xfrm>
-            <a:off x="3610931" y="3835632"/>
-            <a:ext cx="1394934" cy="261610"/>
-          </a:xfrm>
-          <a:prstGeom prst="rect">
-            <a:avLst/>
-          </a:prstGeom>
-          <a:noFill/>
-        </p:spPr>
-        <p:txBody>
-          <a:bodyPr wrap="none" rtlCol="0">
-            <a:spAutoFit/>
-          </a:bodyPr>
-          <a:lstStyle/>
-          <a:p>
-            <a:pPr algn="ctr"/>
-            <a:r>
-              <a:rPr lang="en-US" sz="1100" dirty="0"/>
-              <a:t>Loading (</a:t>
-            </a:r>
-            <a:r>
-              <a:rPr lang="en-US" sz="1100" dirty="0">
-                <a:solidFill>
-                  <a:schemeClr val="accent6"/>
-                </a:solidFill>
-              </a:rPr>
-              <a:t>Green Path</a:t>
-            </a:r>
-            <a:r>
-              <a:rPr lang="en-US" sz="1100" dirty="0"/>
-              <a:t>)</a:t>
-            </a:r>
-          </a:p>
-        </p:txBody>
-      </p:sp>
-      <p:sp>
-        <p:nvSpPr>
-          <p:cNvPr id="58" name="Right Arrow 57"/>
-          <p:cNvSpPr/>
-          <p:nvPr/>
-        </p:nvSpPr>
-        <p:spPr>
-          <a:xfrm rot="19307199">
-            <a:off x="7773506" y="5086268"/>
-            <a:ext cx="1470156" cy="128304"/>
-          </a:xfrm>
-          <a:prstGeom prst="rightArrow">
-            <a:avLst/>
-          </a:prstGeom>
-          <a:gradFill>
-            <a:gsLst>
-              <a:gs pos="0">
-                <a:srgbClr val="FF0000"/>
-              </a:gs>
-              <a:gs pos="50000">
-                <a:schemeClr val="accent2">
-                  <a:lumMod val="105000"/>
-                  <a:satMod val="103000"/>
-                  <a:tint val="73000"/>
-                </a:schemeClr>
-              </a:gs>
-              <a:gs pos="100000">
-                <a:schemeClr val="accent2">
-                  <a:lumMod val="105000"/>
-                  <a:satMod val="109000"/>
-                  <a:tint val="81000"/>
-                </a:schemeClr>
-              </a:gs>
-            </a:gsLst>
-          </a:gradFill>
-          <a:ln/>
-        </p:spPr>
-        <p:style>
-          <a:lnRef idx="1">
-            <a:schemeClr val="accent2"/>
-          </a:lnRef>
-          <a:fillRef idx="2">
-            <a:schemeClr val="accent2"/>
-          </a:fillRef>
-          <a:effectRef idx="1">
-            <a:schemeClr val="accent2"/>
-          </a:effectRef>
-          <a:fontRef idx="minor">
-            <a:schemeClr val="dk1"/>
-          </a:fontRef>
-        </p:style>
-        <p:txBody>
-          <a:bodyPr rtlCol="0" anchor="ctr"/>
-          <a:lstStyle/>
-          <a:p>
-            <a:pPr algn="ctr"/>
-            <a:endParaRPr lang="en-GB" dirty="0"/>
-          </a:p>
-        </p:txBody>
-      </p:sp>
-      <p:sp>
-        <p:nvSpPr>
-          <p:cNvPr id="59" name="Right Arrow 58"/>
-          <p:cNvSpPr/>
-          <p:nvPr/>
-        </p:nvSpPr>
-        <p:spPr>
-          <a:xfrm rot="20221367">
-            <a:off x="6513165" y="5059167"/>
-            <a:ext cx="2545682" cy="124920"/>
-          </a:xfrm>
-          <a:prstGeom prst="rightArrow">
-            <a:avLst/>
-          </a:prstGeom>
-          <a:gradFill>
-            <a:gsLst>
-              <a:gs pos="0">
-                <a:srgbClr val="FF0000"/>
-              </a:gs>
-              <a:gs pos="50000">
-                <a:schemeClr val="accent2">
-                  <a:lumMod val="105000"/>
-                  <a:satMod val="103000"/>
-                  <a:tint val="73000"/>
-                </a:schemeClr>
-              </a:gs>
-              <a:gs pos="100000">
-                <a:schemeClr val="accent2">
-                  <a:lumMod val="105000"/>
-                  <a:satMod val="109000"/>
-                  <a:tint val="81000"/>
-                </a:schemeClr>
-              </a:gs>
-            </a:gsLst>
-          </a:gradFill>
-          <a:ln/>
-        </p:spPr>
-        <p:style>
-          <a:lnRef idx="1">
-            <a:schemeClr val="accent2"/>
-          </a:lnRef>
-          <a:fillRef idx="2">
-            <a:schemeClr val="accent2"/>
-          </a:fillRef>
-          <a:effectRef idx="1">
-            <a:schemeClr val="accent2"/>
-          </a:effectRef>
-          <a:fontRef idx="minor">
-            <a:schemeClr val="dk1"/>
-          </a:fontRef>
-        </p:style>
-        <p:txBody>
-          <a:bodyPr rtlCol="0" anchor="ctr"/>
-          <a:lstStyle/>
-          <a:p>
-            <a:pPr algn="ctr"/>
-            <a:endParaRPr lang="en-GB" dirty="0"/>
-          </a:p>
-        </p:txBody>
-      </p:sp>
-      <p:sp>
-        <p:nvSpPr>
-          <p:cNvPr id="27" name="TextBox 26"/>
-          <p:cNvSpPr txBox="1"/>
-          <p:nvPr/>
-        </p:nvSpPr>
-        <p:spPr>
-          <a:xfrm>
-            <a:off x="4861081" y="5021105"/>
-            <a:ext cx="3609800" cy="369332"/>
-          </a:xfrm>
-          <a:prstGeom prst="rect">
-            <a:avLst/>
-          </a:prstGeom>
-          <a:noFill/>
-        </p:spPr>
-        <p:txBody>
-          <a:bodyPr wrap="square" rtlCol="0">
-            <a:spAutoFit/>
-          </a:bodyPr>
-          <a:lstStyle/>
-          <a:p>
-            <a:r>
-              <a:rPr lang="en-US" dirty="0"/>
-              <a:t>Data Repository (SQL Server 2)</a:t>
-            </a:r>
-            <a:endParaRPr lang="en-GB" dirty="0"/>
-          </a:p>
-        </p:txBody>
-      </p:sp>
-      <p:pic>
-        <p:nvPicPr>
-          <p:cNvPr id="60" name="Picture 59"/>
-          <p:cNvPicPr>
-            <a:picLocks noChangeAspect="1"/>
-          </p:cNvPicPr>
-          <p:nvPr/>
-        </p:nvPicPr>
-        <p:blipFill>
-          <a:blip r:embed="rId7"/>
-          <a:stretch>
-            <a:fillRect/>
-          </a:stretch>
-        </p:blipFill>
-        <p:spPr>
-          <a:xfrm>
-            <a:off x="9157449" y="3825240"/>
-            <a:ext cx="626466" cy="435045"/>
-          </a:xfrm>
-          <a:prstGeom prst="rect">
-            <a:avLst/>
-          </a:prstGeom>
-        </p:spPr>
-      </p:pic>
-      <p:sp>
-        <p:nvSpPr>
-          <p:cNvPr id="61" name="TextBox 60"/>
-          <p:cNvSpPr txBox="1"/>
-          <p:nvPr/>
-        </p:nvSpPr>
-        <p:spPr>
-          <a:xfrm>
-            <a:off x="8604484" y="4195819"/>
-            <a:ext cx="1670650" cy="430887"/>
-          </a:xfrm>
-          <a:prstGeom prst="rect">
-            <a:avLst/>
-          </a:prstGeom>
-          <a:noFill/>
-        </p:spPr>
-        <p:txBody>
-          <a:bodyPr wrap="none" rtlCol="0">
-            <a:spAutoFit/>
-          </a:bodyPr>
-          <a:lstStyle/>
-          <a:p>
-            <a:pPr algn="ctr"/>
-            <a:r>
-              <a:rPr lang="en-US" sz="1100" dirty="0"/>
-              <a:t>Project Extracts</a:t>
-            </a:r>
-          </a:p>
-          <a:p>
-            <a:pPr algn="ctr"/>
-            <a:r>
-              <a:rPr lang="en-US" sz="1100" dirty="0"/>
-              <a:t>(OnExtract anonymisation</a:t>
-            </a:r>
-          </a:p>
-        </p:txBody>
-      </p:sp>
-      <p:sp>
-        <p:nvSpPr>
-          <p:cNvPr id="64" name="TextBox 63"/>
-          <p:cNvSpPr txBox="1"/>
-          <p:nvPr/>
-        </p:nvSpPr>
-        <p:spPr>
-          <a:xfrm>
-            <a:off x="3596439" y="4437005"/>
-            <a:ext cx="1354083" cy="430887"/>
-          </a:xfrm>
-          <a:prstGeom prst="rect">
-            <a:avLst/>
-          </a:prstGeom>
-          <a:noFill/>
-        </p:spPr>
-        <p:txBody>
-          <a:bodyPr wrap="square" rtlCol="0">
-            <a:spAutoFit/>
-          </a:bodyPr>
-          <a:lstStyle/>
-          <a:p>
-            <a:pPr algn="ctr"/>
-            <a:r>
-              <a:rPr lang="en-US" sz="1100" dirty="0"/>
-              <a:t>Data Quality Engine</a:t>
-            </a:r>
-          </a:p>
-          <a:p>
-            <a:pPr algn="ctr"/>
-            <a:r>
-              <a:rPr lang="en-US" sz="1100" dirty="0">
-                <a:solidFill>
-                  <a:schemeClr val="accent4">
-                    <a:lumMod val="60000"/>
-                    <a:lumOff val="40000"/>
-                  </a:schemeClr>
-                </a:solidFill>
-              </a:rPr>
-              <a:t>(Orange Path)</a:t>
-            </a:r>
-          </a:p>
-        </p:txBody>
-      </p:sp>
-      <p:sp>
-        <p:nvSpPr>
-          <p:cNvPr id="65" name="TextBox 64"/>
-          <p:cNvSpPr txBox="1"/>
-          <p:nvPr/>
-        </p:nvSpPr>
-        <p:spPr>
-          <a:xfrm>
-            <a:off x="2749662" y="4427070"/>
-            <a:ext cx="788999" cy="430887"/>
-          </a:xfrm>
-          <a:prstGeom prst="rect">
-            <a:avLst/>
-          </a:prstGeom>
-          <a:noFill/>
-        </p:spPr>
-        <p:txBody>
-          <a:bodyPr wrap="none" rtlCol="0">
-            <a:spAutoFit/>
-          </a:bodyPr>
-          <a:lstStyle/>
-          <a:p>
-            <a:pPr algn="ctr"/>
-            <a:r>
-              <a:rPr lang="en-US" sz="1100" dirty="0"/>
-              <a:t>Catalogue </a:t>
-            </a:r>
-          </a:p>
-          <a:p>
-            <a:pPr algn="ctr"/>
-            <a:r>
-              <a:rPr lang="en-US" sz="1100" dirty="0"/>
-              <a:t>Manager</a:t>
-            </a:r>
-          </a:p>
-        </p:txBody>
-      </p:sp>
-      <p:sp>
-        <p:nvSpPr>
-          <p:cNvPr id="66" name="TextBox 65"/>
-          <p:cNvSpPr txBox="1"/>
-          <p:nvPr/>
-        </p:nvSpPr>
-        <p:spPr>
-          <a:xfrm>
-            <a:off x="2716146" y="3969810"/>
-            <a:ext cx="805029" cy="261610"/>
-          </a:xfrm>
-          <a:prstGeom prst="rect">
-            <a:avLst/>
-          </a:prstGeom>
-          <a:noFill/>
-        </p:spPr>
-        <p:txBody>
-          <a:bodyPr wrap="none" rtlCol="0">
-            <a:spAutoFit/>
-          </a:bodyPr>
-          <a:lstStyle/>
-          <a:p>
-            <a:pPr algn="ctr"/>
-            <a:r>
-              <a:rPr lang="en-US" sz="1100" dirty="0"/>
-              <a:t>Dashboard</a:t>
-            </a:r>
-          </a:p>
-        </p:txBody>
-      </p:sp>
-      <p:pic>
-        <p:nvPicPr>
-          <p:cNvPr id="67" name="Picture 66"/>
-          <p:cNvPicPr>
-            <a:picLocks noChangeAspect="1"/>
-          </p:cNvPicPr>
-          <p:nvPr/>
-        </p:nvPicPr>
-        <p:blipFill>
-          <a:blip r:embed="rId8"/>
-          <a:stretch>
-            <a:fillRect/>
-          </a:stretch>
-        </p:blipFill>
-        <p:spPr>
-          <a:xfrm>
-            <a:off x="6687172" y="2388060"/>
-            <a:ext cx="566525" cy="566525"/>
-          </a:xfrm>
-          <a:prstGeom prst="rect">
-            <a:avLst/>
-          </a:prstGeom>
-        </p:spPr>
-      </p:pic>
-      <p:sp>
-        <p:nvSpPr>
-          <p:cNvPr id="69" name="TextBox 68"/>
-          <p:cNvSpPr txBox="1"/>
-          <p:nvPr/>
-        </p:nvSpPr>
-        <p:spPr>
-          <a:xfrm>
-            <a:off x="6443202" y="2877633"/>
-            <a:ext cx="1167306" cy="430887"/>
-          </a:xfrm>
-          <a:prstGeom prst="rect">
-            <a:avLst/>
-          </a:prstGeom>
-          <a:noFill/>
-        </p:spPr>
-        <p:txBody>
-          <a:bodyPr wrap="none" rtlCol="0">
-            <a:spAutoFit/>
-          </a:bodyPr>
-          <a:lstStyle/>
-          <a:p>
-            <a:pPr algn="ctr"/>
-            <a:r>
-              <a:rPr lang="en-US" sz="1100" dirty="0"/>
-              <a:t>Optional on load </a:t>
-            </a:r>
-          </a:p>
-          <a:p>
-            <a:pPr algn="ctr"/>
-            <a:r>
-              <a:rPr lang="en-US" sz="1100" dirty="0"/>
-              <a:t>anonymisation</a:t>
-            </a:r>
-          </a:p>
-        </p:txBody>
-      </p:sp>
-      <p:pic>
-        <p:nvPicPr>
-          <p:cNvPr id="70" name="Picture 69"/>
-          <p:cNvPicPr>
-            <a:picLocks noChangeAspect="1"/>
-          </p:cNvPicPr>
-          <p:nvPr/>
-        </p:nvPicPr>
-        <p:blipFill>
-          <a:blip r:embed="rId8"/>
-          <a:stretch>
-            <a:fillRect/>
-          </a:stretch>
-        </p:blipFill>
-        <p:spPr>
-          <a:xfrm>
-            <a:off x="8886816" y="4782229"/>
-            <a:ext cx="566525" cy="566525"/>
-          </a:xfrm>
-          <a:prstGeom prst="rect">
-            <a:avLst/>
-          </a:prstGeom>
-        </p:spPr>
-      </p:pic>
-      <p:sp>
-        <p:nvSpPr>
-          <p:cNvPr id="71" name="TextBox 70"/>
-          <p:cNvSpPr txBox="1"/>
-          <p:nvPr/>
-        </p:nvSpPr>
-        <p:spPr>
-          <a:xfrm>
-            <a:off x="8420029" y="5271802"/>
-            <a:ext cx="1612942" cy="430887"/>
-          </a:xfrm>
-          <a:prstGeom prst="rect">
-            <a:avLst/>
-          </a:prstGeom>
-          <a:noFill/>
-        </p:spPr>
-        <p:txBody>
-          <a:bodyPr wrap="none" rtlCol="0">
-            <a:spAutoFit/>
-          </a:bodyPr>
-          <a:lstStyle/>
-          <a:p>
-            <a:pPr algn="ctr"/>
-            <a:r>
-              <a:rPr lang="en-US" sz="1100" dirty="0"/>
-              <a:t>Mandatory on extraction</a:t>
-            </a:r>
-          </a:p>
-          <a:p>
-            <a:pPr algn="ctr"/>
-            <a:r>
-              <a:rPr lang="en-US" sz="1100" dirty="0"/>
-              <a:t>anonymisation</a:t>
-            </a:r>
-          </a:p>
-        </p:txBody>
-      </p:sp>
-      <p:pic>
-        <p:nvPicPr>
-          <p:cNvPr id="68" name="Picture 67"/>
-          <p:cNvPicPr>
-            <a:picLocks noChangeAspect="1"/>
-          </p:cNvPicPr>
-          <p:nvPr/>
-        </p:nvPicPr>
-        <p:blipFill>
-          <a:blip r:embed="rId6"/>
-          <a:stretch>
-            <a:fillRect/>
-          </a:stretch>
-        </p:blipFill>
-        <p:spPr>
-          <a:xfrm>
-            <a:off x="4439929" y="2329670"/>
-            <a:ext cx="400805" cy="420262"/>
-          </a:xfrm>
-          <a:prstGeom prst="rect">
-            <a:avLst/>
-          </a:prstGeom>
-        </p:spPr>
-      </p:pic>
-      <p:sp>
-        <p:nvSpPr>
-          <p:cNvPr id="72" name="TextBox 71"/>
-          <p:cNvSpPr txBox="1"/>
-          <p:nvPr/>
-        </p:nvSpPr>
-        <p:spPr>
-          <a:xfrm>
-            <a:off x="3925236" y="2683492"/>
-            <a:ext cx="1430200" cy="261610"/>
-          </a:xfrm>
-          <a:prstGeom prst="rect">
-            <a:avLst/>
-          </a:prstGeom>
-          <a:noFill/>
-        </p:spPr>
-        <p:txBody>
-          <a:bodyPr wrap="none" rtlCol="0">
-            <a:spAutoFit/>
-          </a:bodyPr>
-          <a:lstStyle/>
-          <a:p>
-            <a:pPr algn="ctr"/>
-            <a:r>
-              <a:rPr lang="en-US" sz="1100" dirty="0"/>
-              <a:t>Cached Query Results</a:t>
-            </a:r>
-          </a:p>
-        </p:txBody>
-      </p:sp>
-      <p:sp>
-        <p:nvSpPr>
-          <p:cNvPr id="2" name="Rectangle 1"/>
-          <p:cNvSpPr/>
-          <p:nvPr/>
-        </p:nvSpPr>
-        <p:spPr>
-          <a:xfrm>
-            <a:off x="2624732" y="217552"/>
-            <a:ext cx="1683666" cy="479681"/>
-          </a:xfrm>
-          <a:prstGeom prst="rect">
-            <a:avLst/>
-          </a:prstGeom>
-        </p:spPr>
-        <p:style>
-          <a:lnRef idx="2">
-            <a:schemeClr val="accent1">
-              <a:shade val="50000"/>
-            </a:schemeClr>
-          </a:lnRef>
-          <a:fillRef idx="1">
-            <a:schemeClr val="accent1"/>
-          </a:fillRef>
-          <a:effectRef idx="0">
-            <a:schemeClr val="accent1"/>
-          </a:effectRef>
-          <a:fontRef idx="minor">
-            <a:schemeClr val="lt1"/>
-          </a:fontRef>
-        </p:style>
-        <p:txBody>
-          <a:bodyPr rtlCol="0" anchor="ctr"/>
-          <a:lstStyle/>
-          <a:p>
-            <a:pPr algn="ctr"/>
-            <a:r>
-              <a:rPr lang="en-GB" dirty="0"/>
-              <a:t>Web Service</a:t>
-            </a:r>
-          </a:p>
-        </p:txBody>
-      </p:sp>
-      <p:pic>
-        <p:nvPicPr>
-          <p:cNvPr id="73" name="Picture 72"/>
-          <p:cNvPicPr>
-            <a:picLocks noChangeAspect="1"/>
-          </p:cNvPicPr>
-          <p:nvPr/>
-        </p:nvPicPr>
-        <p:blipFill>
-          <a:blip r:embed="rId8"/>
-          <a:stretch>
-            <a:fillRect/>
-          </a:stretch>
-        </p:blipFill>
-        <p:spPr>
-          <a:xfrm>
-            <a:off x="4003998" y="364608"/>
-            <a:ext cx="566525" cy="566525"/>
-          </a:xfrm>
-          <a:prstGeom prst="rect">
-            <a:avLst/>
-          </a:prstGeom>
-        </p:spPr>
-      </p:pic>
-      <p:sp>
-        <p:nvSpPr>
-          <p:cNvPr id="74" name="Right Arrow 73"/>
-          <p:cNvSpPr/>
-          <p:nvPr/>
-        </p:nvSpPr>
-        <p:spPr>
-          <a:xfrm rot="18532077">
-            <a:off x="3788441" y="3943247"/>
-            <a:ext cx="4479776" cy="172604"/>
-          </a:xfrm>
-          <a:prstGeom prst="rightArrow">
-            <a:avLst/>
-          </a:prstGeom>
-          <a:solidFill>
-            <a:schemeClr val="accent6">
-              <a:alpha val="51000"/>
-            </a:schemeClr>
-          </a:solidFill>
-          <a:ln>
-            <a:solidFill>
-              <a:schemeClr val="accent6">
-                <a:shade val="50000"/>
-                <a:alpha val="50000"/>
-              </a:schemeClr>
-            </a:solidFill>
-          </a:ln>
-        </p:spPr>
-        <p:style>
-          <a:lnRef idx="2">
-            <a:schemeClr val="accent6">
-              <a:shade val="50000"/>
-            </a:schemeClr>
-          </a:lnRef>
-          <a:fillRef idx="1">
-            <a:schemeClr val="accent6"/>
-          </a:fillRef>
-          <a:effectRef idx="0">
-            <a:schemeClr val="accent6"/>
-          </a:effectRef>
-          <a:fontRef idx="minor">
-            <a:schemeClr val="lt1"/>
-          </a:fontRef>
-        </p:style>
-        <p:txBody>
-          <a:bodyPr rtlCol="0" anchor="ctr"/>
-          <a:lstStyle/>
-          <a:p>
-            <a:pPr algn="ctr"/>
-            <a:endParaRPr lang="en-GB" dirty="0"/>
-          </a:p>
-        </p:txBody>
-      </p:sp>
-      <p:sp>
-        <p:nvSpPr>
-          <p:cNvPr id="44" name="Right Arrow 43"/>
-          <p:cNvSpPr/>
-          <p:nvPr/>
-        </p:nvSpPr>
-        <p:spPr>
-          <a:xfrm rot="15838627">
-            <a:off x="3713463" y="1574649"/>
-            <a:ext cx="1548240" cy="121025"/>
-          </a:xfrm>
-          <a:prstGeom prst="rightArrow">
-            <a:avLst/>
-          </a:prstGeom>
-          <a:ln/>
-        </p:spPr>
-        <p:style>
-          <a:lnRef idx="1">
-            <a:schemeClr val="accent4"/>
-          </a:lnRef>
-          <a:fillRef idx="2">
-            <a:schemeClr val="accent4"/>
-          </a:fillRef>
-          <a:effectRef idx="1">
-            <a:schemeClr val="accent4"/>
-          </a:effectRef>
-          <a:fontRef idx="minor">
-            <a:schemeClr val="dk1"/>
-          </a:fontRef>
-        </p:style>
-        <p:txBody>
-          <a:bodyPr rtlCol="0" anchor="ctr"/>
-          <a:lstStyle/>
-          <a:p>
-            <a:pPr algn="ctr"/>
-            <a:endParaRPr lang="en-GB" dirty="0">
-              <a:ln>
-                <a:solidFill>
-                  <a:sysClr val="windowText" lastClr="000000"/>
-                </a:solidFill>
-              </a:ln>
-            </a:endParaRPr>
-          </a:p>
-        </p:txBody>
-      </p:sp>
-      <p:sp>
-        <p:nvSpPr>
-          <p:cNvPr id="75" name="Right Arrow 74"/>
-          <p:cNvSpPr/>
-          <p:nvPr/>
-        </p:nvSpPr>
-        <p:spPr>
-          <a:xfrm rot="17500067">
-            <a:off x="3108932" y="1446399"/>
-            <a:ext cx="1414664" cy="121025"/>
-          </a:xfrm>
-          <a:prstGeom prst="rightArrow">
-            <a:avLst/>
-          </a:prstGeom>
-          <a:ln/>
-        </p:spPr>
-        <p:style>
-          <a:lnRef idx="1">
-            <a:schemeClr val="accent4"/>
-          </a:lnRef>
-          <a:fillRef idx="2">
-            <a:schemeClr val="accent4"/>
-          </a:fillRef>
-          <a:effectRef idx="1">
-            <a:schemeClr val="accent4"/>
-          </a:effectRef>
-          <a:fontRef idx="minor">
-            <a:schemeClr val="dk1"/>
-          </a:fontRef>
-        </p:style>
-        <p:txBody>
-          <a:bodyPr rtlCol="0" anchor="ctr"/>
-          <a:lstStyle/>
-          <a:p>
-            <a:pPr algn="ctr"/>
-            <a:endParaRPr lang="en-GB" dirty="0">
-              <a:ln>
-                <a:solidFill>
-                  <a:sysClr val="windowText" lastClr="000000"/>
-                </a:solidFill>
-              </a:ln>
-            </a:endParaRPr>
-          </a:p>
-        </p:txBody>
-      </p:sp>
-      <p:sp>
-        <p:nvSpPr>
-          <p:cNvPr id="76" name="Right Arrow 75"/>
-          <p:cNvSpPr/>
-          <p:nvPr/>
-        </p:nvSpPr>
-        <p:spPr>
-          <a:xfrm rot="19969985">
-            <a:off x="2344444" y="1083277"/>
-            <a:ext cx="1805138" cy="121025"/>
-          </a:xfrm>
-          <a:prstGeom prst="rightArrow">
-            <a:avLst/>
-          </a:prstGeom>
-          <a:ln/>
-        </p:spPr>
-        <p:style>
-          <a:lnRef idx="1">
-            <a:schemeClr val="accent4"/>
-          </a:lnRef>
-          <a:fillRef idx="2">
-            <a:schemeClr val="accent4"/>
-          </a:fillRef>
-          <a:effectRef idx="1">
-            <a:schemeClr val="accent4"/>
-          </a:effectRef>
-          <a:fontRef idx="minor">
-            <a:schemeClr val="dk1"/>
-          </a:fontRef>
-        </p:style>
-        <p:txBody>
-          <a:bodyPr rtlCol="0" anchor="ctr"/>
-          <a:lstStyle/>
-          <a:p>
-            <a:pPr algn="ctr"/>
-            <a:endParaRPr lang="en-GB" dirty="0">
-              <a:ln>
-                <a:solidFill>
-                  <a:sysClr val="windowText" lastClr="000000"/>
-                </a:solidFill>
-              </a:ln>
-            </a:endParaRPr>
-          </a:p>
-        </p:txBody>
-      </p:sp>
-      <p:sp>
-        <p:nvSpPr>
-          <p:cNvPr id="77" name="Right Arrow 76"/>
-          <p:cNvSpPr/>
-          <p:nvPr/>
-        </p:nvSpPr>
-        <p:spPr>
-          <a:xfrm rot="14164671">
-            <a:off x="4097680" y="4125413"/>
-            <a:ext cx="3148423" cy="166105"/>
-          </a:xfrm>
-          <a:prstGeom prst="rightArrow">
-            <a:avLst/>
-          </a:prstGeom>
-          <a:ln/>
-        </p:spPr>
-        <p:style>
-          <a:lnRef idx="1">
-            <a:schemeClr val="accent4"/>
-          </a:lnRef>
-          <a:fillRef idx="2">
-            <a:schemeClr val="accent4"/>
-          </a:fillRef>
-          <a:effectRef idx="1">
-            <a:schemeClr val="accent4"/>
-          </a:effectRef>
-          <a:fontRef idx="minor">
-            <a:schemeClr val="dk1"/>
-          </a:fontRef>
-        </p:style>
-        <p:txBody>
-          <a:bodyPr rtlCol="0" anchor="ctr"/>
-          <a:lstStyle/>
-          <a:p>
-            <a:pPr algn="ctr"/>
-            <a:endParaRPr lang="en-GB" dirty="0">
-              <a:ln>
-                <a:solidFill>
-                  <a:sysClr val="windowText" lastClr="000000"/>
-                </a:solidFill>
-              </a:ln>
-            </a:endParaRPr>
-          </a:p>
-        </p:txBody>
-      </p:sp>
-      <p:pic>
-        <p:nvPicPr>
-          <p:cNvPr id="5" name="Picture 4"/>
-          <p:cNvPicPr/>
-          <p:nvPr/>
-        </p:nvPicPr>
-        <p:blipFill>
-          <a:blip r:embed="rId9"/>
-          <a:stretch>
-            <a:fillRect/>
-          </a:stretch>
-        </p:blipFill>
-        <p:spPr>
-          <a:xfrm>
-            <a:off x="5412505" y="3588497"/>
-            <a:ext cx="318770" cy="318770"/>
-          </a:xfrm>
-          <a:prstGeom prst="rect">
-            <a:avLst/>
-          </a:prstGeom>
-        </p:spPr>
-      </p:pic>
-      <p:pic>
-        <p:nvPicPr>
-          <p:cNvPr id="7" name="Picture 6"/>
-          <p:cNvPicPr/>
-          <p:nvPr/>
-        </p:nvPicPr>
-        <p:blipFill>
-          <a:blip r:embed="rId10"/>
-          <a:stretch>
-            <a:fillRect/>
-          </a:stretch>
-        </p:blipFill>
-        <p:spPr>
-          <a:xfrm>
-            <a:off x="5308555" y="4107006"/>
-            <a:ext cx="333375" cy="333375"/>
-          </a:xfrm>
-          <a:prstGeom prst="rect">
-            <a:avLst/>
-          </a:prstGeom>
-        </p:spPr>
-      </p:pic>
-      <p:sp>
-        <p:nvSpPr>
-          <p:cNvPr id="62" name="TextBox 61"/>
-          <p:cNvSpPr txBox="1"/>
-          <p:nvPr/>
-        </p:nvSpPr>
-        <p:spPr>
-          <a:xfrm>
-            <a:off x="4947301" y="3847513"/>
-            <a:ext cx="1394934" cy="261610"/>
-          </a:xfrm>
-          <a:prstGeom prst="rect">
-            <a:avLst/>
-          </a:prstGeom>
-          <a:noFill/>
-        </p:spPr>
-        <p:txBody>
-          <a:bodyPr wrap="none" rtlCol="0">
-            <a:spAutoFit/>
-          </a:bodyPr>
-          <a:lstStyle/>
-          <a:p>
-            <a:pPr algn="ctr"/>
-            <a:r>
-              <a:rPr lang="en-US" sz="1100" dirty="0"/>
-              <a:t>Extraction (</a:t>
-            </a:r>
-            <a:r>
-              <a:rPr lang="en-US" sz="1100" dirty="0">
-                <a:solidFill>
-                  <a:srgbClr val="FF0000"/>
-                </a:solidFill>
-              </a:rPr>
-              <a:t>Red Path</a:t>
-            </a:r>
-            <a:r>
-              <a:rPr lang="en-US" sz="1100" dirty="0"/>
-              <a:t>)</a:t>
-            </a:r>
-          </a:p>
-        </p:txBody>
-      </p:sp>
-      <p:sp>
-        <p:nvSpPr>
-          <p:cNvPr id="63" name="TextBox 62"/>
-          <p:cNvSpPr txBox="1"/>
-          <p:nvPr/>
-        </p:nvSpPr>
-        <p:spPr>
-          <a:xfrm>
-            <a:off x="4800028" y="4398281"/>
-            <a:ext cx="1412566" cy="261610"/>
-          </a:xfrm>
-          <a:prstGeom prst="rect">
-            <a:avLst/>
-          </a:prstGeom>
-          <a:noFill/>
-        </p:spPr>
-        <p:txBody>
-          <a:bodyPr wrap="none" rtlCol="0">
-            <a:spAutoFit/>
-          </a:bodyPr>
-          <a:lstStyle/>
-          <a:p>
-            <a:pPr algn="ctr"/>
-            <a:r>
-              <a:rPr lang="en-US" sz="1100" dirty="0"/>
-              <a:t>Cohort Identification</a:t>
-            </a:r>
-          </a:p>
-        </p:txBody>
-      </p:sp>
-    </p:spTree>
-    <p:extLst>
-      <p:ext uri="{BB962C8B-B14F-4D97-AF65-F5344CB8AC3E}">
-        <p14:creationId xmlns:p14="http://schemas.microsoft.com/office/powerpoint/2010/main" val="2138483977"/>
-      </p:ext>
-    </p:extLst>
-  </p:cSld>
-  <p:clrMapOvr>
-    <a:masterClrMapping/>
-  </p:clrMapOvr>
-</p:sld>
-</file>
-
-<file path=ppt/slides/slide4.xml><?xml version="1.0" encoding="utf-8"?>
-<p:sld xmlns:a="http://schemas.openxmlformats.org/drawingml/2006/main" xmlns:r="http://schemas.openxmlformats.org/officeDocument/2006/relationships" xmlns:p="http://schemas.openxmlformats.org/presentationml/2006/main">
-  <p:cSld>
-    <p:spTree>
-      <p:nvGrpSpPr>
-        <p:cNvPr id="1" name=""/>
-        <p:cNvGrpSpPr/>
-        <p:nvPr/>
-      </p:nvGrpSpPr>
-      <p:grpSpPr>
-        <a:xfrm>
-          <a:off x="0" y="0"/>
-          <a:ext cx="0" cy="0"/>
-          <a:chOff x="0" y="0"/>
-          <a:chExt cx="0" cy="0"/>
-        </a:xfrm>
-      </p:grpSpPr>
       <p:graphicFrame>
         <p:nvGraphicFramePr>
           <p:cNvPr id="18" name="Diagram 17"/>
@@ -45568,7 +43168,7 @@
 </p:sld>
 </file>
 
-<file path=ppt/slides/slide5.xml><?xml version="1.0" encoding="utf-8"?>
+<file path=ppt/slides/slide4.xml><?xml version="1.0" encoding="utf-8"?>
 <p:sld xmlns:a="http://schemas.openxmlformats.org/drawingml/2006/main" xmlns:r="http://schemas.openxmlformats.org/officeDocument/2006/relationships" xmlns:p="http://schemas.openxmlformats.org/presentationml/2006/main">
   <p:cSld>
     <p:spTree>
@@ -45779,7 +43379,7 @@
 </p:sld>
 </file>
 
-<file path=ppt/slides/slide6.xml><?xml version="1.0" encoding="utf-8"?>
+<file path=ppt/slides/slide5.xml><?xml version="1.0" encoding="utf-8"?>
 <p:sld xmlns:a="http://schemas.openxmlformats.org/drawingml/2006/main" xmlns:r="http://schemas.openxmlformats.org/officeDocument/2006/relationships" xmlns:p="http://schemas.openxmlformats.org/presentationml/2006/main">
   <p:cSld>
     <p:spTree>
@@ -46085,7 +43685,7 @@
 </p:sld>
 </file>
 
-<file path=ppt/slides/slide7.xml><?xml version="1.0" encoding="utf-8"?>
+<file path=ppt/slides/slide6.xml><?xml version="1.0" encoding="utf-8"?>
 <p:sld xmlns:a="http://schemas.openxmlformats.org/drawingml/2006/main" xmlns:r="http://schemas.openxmlformats.org/officeDocument/2006/relationships" xmlns:p="http://schemas.openxmlformats.org/presentationml/2006/main">
   <p:cSld>
     <p:spTree>
@@ -46270,7 +43870,7 @@
 </p:sld>
 </file>
 
-<file path=ppt/slides/slide8.xml><?xml version="1.0" encoding="utf-8"?>
+<file path=ppt/slides/slide7.xml><?xml version="1.0" encoding="utf-8"?>
 <p:sld xmlns:a="http://schemas.openxmlformats.org/drawingml/2006/main" xmlns:r="http://schemas.openxmlformats.org/officeDocument/2006/relationships" xmlns:p="http://schemas.openxmlformats.org/presentationml/2006/main">
   <p:cSld>
     <p:spTree>
@@ -46433,7 +44033,7 @@
 </p:sld>
 </file>
 
-<file path=ppt/slides/slide9.xml><?xml version="1.0" encoding="utf-8"?>
+<file path=ppt/slides/slide8.xml><?xml version="1.0" encoding="utf-8"?>
 <p:sld xmlns:a="http://schemas.openxmlformats.org/drawingml/2006/main" xmlns:r="http://schemas.openxmlformats.org/officeDocument/2006/relationships" xmlns:p="http://schemas.openxmlformats.org/presentationml/2006/main">
   <p:cSld>
     <p:spTree>

</xml_diff>